<commit_message>
vet and animal, question, choiceQuestion, numerical qustion
</commit_message>
<xml_diff>
--- a/135/slides/ch04/nestedLoop.pptx
+++ b/135/slides/ch04/nestedLoop.pptx
@@ -5,7 +5,7 @@
     <p:sldMasterId id="2147483648" r:id="rId1"/>
   </p:sldMasterIdLst>
   <p:notesMasterIdLst>
-    <p:notesMasterId r:id="rId15"/>
+    <p:notesMasterId r:id="rId18"/>
   </p:notesMasterIdLst>
   <p:sldIdLst>
     <p:sldId id="256" r:id="rId2"/>
@@ -21,6 +21,9 @@
     <p:sldId id="275" r:id="rId12"/>
     <p:sldId id="276" r:id="rId13"/>
     <p:sldId id="277" r:id="rId14"/>
+    <p:sldId id="281" r:id="rId15"/>
+    <p:sldId id="282" r:id="rId16"/>
+    <p:sldId id="283" r:id="rId17"/>
   </p:sldIdLst>
   <p:sldSz cx="9144000" cy="6858000" type="screen4x3"/>
   <p:notesSz cx="6858000" cy="9144000"/>
@@ -138,6 +141,64 @@
 </p:presentation>
 </file>
 
+<file path=ppt/ink/ink1.xml><?xml version="1.0" encoding="utf-8"?>
+<inkml:ink xmlns:inkml="http://www.w3.org/2003/InkML">
+  <inkml:definitions>
+    <inkml:context xml:id="ctx0">
+      <inkml:inkSource xml:id="inkSrc0">
+        <inkml:traceFormat>
+          <inkml:channel name="X" type="integer" min="-2.14748E9" max="2.14748E9" units="cm"/>
+          <inkml:channel name="Y" type="integer" min="-2.14748E9" max="2.14748E9" units="cm"/>
+          <inkml:channel name="F" type="integer" max="32767" units="dev"/>
+        </inkml:traceFormat>
+        <inkml:channelProperties>
+          <inkml:channelProperty channel="X" name="resolution" value="1000" units="1/cm"/>
+          <inkml:channelProperty channel="Y" name="resolution" value="1000" units="1/cm"/>
+          <inkml:channelProperty channel="F" name="resolution" value="0" units="1/dev"/>
+        </inkml:channelProperties>
+      </inkml:inkSource>
+      <inkml:timestamp xml:id="ts0" timeString="2023-09-14T12:45:43.755"/>
+    </inkml:context>
+    <inkml:brush xml:id="br0">
+      <inkml:brushProperty name="width" value="0.05292" units="cm"/>
+      <inkml:brushProperty name="height" value="0.05292" units="cm"/>
+      <inkml:brushProperty name="color" value="#0070C0"/>
+    </inkml:brush>
+  </inkml:definitions>
+  <inkml:trace contextRef="#ctx0" brushRef="#br0">3009 8081 24575,'-28'-4'0,"0"-2"0,-24-2 0,-20-7 0,12-1 0,19 7 0,-2 0 0,-10 1 0,1 1 0,12 3 0,0 0 0,-9-1 0,1 2 0,-16 3 0,30 0 0,-5 3 0,7 17 0,-10 18 0,14-4 0,-1 2 0,4-5 0,1 0 0,0 4 0,1-1 0,-13 28 0,15-12 0,-2 15 0,18-27 0,3 4 0,-3 7 0,5 5 0,14 14 0,8 9 0,-3-8 0,-6-10 0,2-3 0,7 0 0,5 3 0,0-17 0,9-17 0,5-3 0,5-4 0,-4-5 0,5 0 0,9 2 0,2-1 0,4 1 0,0 0 0,5 0 0,-2 1 0,-10-4 0,2 2 0,6 0 0,6 2 0,-2-1 0,-11-3 0,-3 0 0,4 0-196,-1-1 1,3 1 0,1 0 0,-5-1 195,0 0 0,-3-2 0,-1 0 0,0 0 0,-1 0 0,1-1 0,0 0 0,0 0 0,1-1 0,0-1 0,1-2 0,-1 0 0,0 0 0,0-2 0,0 0-113,0 0 0,1-2 1,-1 1 112,-1-1 0,0 0 0,0 0 0,22 0 0,0 0 0,-2-1 0,-2 0 0,-5 0 0,3-1 0,2 1 0,6 1 0,-6-1 0,-1-1 0,0 1 0,-1 1 0,5-1 0,-1 1 0,-5 0 0,-1 0 0,-2 0 0,-10 0 0,-2 0 0,4 0 0,15 0 0,5 0 0,0 0 0,-14 0 0,1 0 0,-1 0 0,-2 0 0,3 0 0,-3-1 0,3 0 0,-5 0 0,3 0 0,0-1 0,1 1 0,4-1 0,1 1 0,-1 0 0,-3-1 0,0 0 0,-3 0 0,2 1-215,1 0 0,3 0 0,0 1 0,-4-1 215,-4 1 0,-3 0 0,-1 0 0,-1 0 0,0 0 0,-2 1 290,24 4 1,0 2-291,-3 3 0,-2 3 0,-5 3 0,-2 2 0,-2 1 0,0 0 167,12 0 0,-2-3-167,-21-5 0,-1-3 0,9 0 0,-3-5 0,6-13 902,-11-5-902,-11-2 162,-9 5-162,-3 7 0,21 3 0,10 2 0,-4 0 0,10 0 0,-9 1 0,12 0 0,7 0 0,2 0 0,-2 0 0,-8 0 0,4-1 0,-6 0 0,0 1 0,6-1-404,-1 1 1,6 0-1,2 0 1,1 0-1,-4 0 1,-7-1 403,0 1 0,-5-1 0,-3-1 0,1 1 0,-2 0 0,0 0 0,0 0 0,2 0-345,11 2 1,4 0 0,0 0-1,-5 0 345,-2-1 0,-3 0 0,3 1-153,1 1 1,6 1 0,-3 0-1,-9-1 153,2-2 0,-5 1 0,4 0 0,-4 1 0,9 2 0,3 4 0,-13-4 0,10-1 0,7-1 0,-15-4 0,3-1 0,4-2 0,2 0 0,0 0 234,-2 0 1,1-1 0,2 0 0,0 0 0,0-1 0,-1 0-235,1 0 0,0-2 0,1 1 0,-2-1 0,-2 0 0,-3-1 0,13-2 0,-3-1 0,-5 1 0,-4 0 481,-7 1 0,-5 1 0,-6-1-481,-4-1 0,-7-2 718,14-13-718,-16 1 0,5-5 0,-6-3 839,4-4-839,4-1 0,-1 4 0,-8 10 0,-7 6 0,-9 6 0,-6-1 0,-3-1 0,-1-6 0,1-9 0,-1-11 0,-1-7 0,0-5 0,-3-1 0,-1-3 0,2-12 0,-1 1 0,-1 17 0,-2 6 0,-4-18 0,-7 27 0,-9-3 0,-3-1 0,-2-3 0,2 6 0,-2 0 0,-9-17 0,-2 0 0,4 12 0,-2 4 0,-3-1 0,-9 4 0,-14 10 0,-12 5 0,5 2 0,-2-1 0,-2 4-167,17 7 0,-6 2 0,1 2 1,5 1 166,-16 5 0,4 2 0,-2 1 0,0 0 0,3 1 0,-7-1 0,17-2 0,-9-1 0,-3 0 0,2 0 0,7-1 0,0 1 0,5-1 0,-6 0-168,1 0 0,-7 0 1,-2 0-1,3 0 1,10-2 167,-11-1 0,4-1-103,6-1 0,-3 1 0,3-2 103,-7-1 0,2-1 209,9 1 1,0 1 0,2-1-210,-2 0 0,2 1 0,-1 0 0,1 1 0,1 1 0,-1 0 426,-10 1 0,2 0-426,15 1 0,0 0 166,-5 0 1,1 0-167,-14 0 0,-2 0 0,4 0 0,-5 0 0,11 0 0,-2 0 0,1 0 0,-4 0 0,2 0-224,-18 0 0,0 0 224,21 0 0,-1 0 0,-1 0 0,-6 0 0,0 0 0,-2 0 0,0 0 0,-1 0 0,-5 0 0,11 0 0,-3 0 0,-2 0 0,-2 0 0,1 1 0,-5 1 0,-1 1 0,0 0 0,0 0 0,0-1 0,3 0 0,0-1 0,1 1 0,-1-1 0,0 1 0,-5 0 0,-2 1 0,0 0 0,5 0 0,5-1 0,1-1 0,7 0 0,-3-1 0,1 2 0,-4-1 0,1 0 0,7 0 0,-10-1 0,5 1 0,-9 1 0,2 0 0,14-2 0,1 0 0,1 0 0,-1 0 0,0 0 0,0 0 0,1 0 0,-1 0 0,-9 0 0,-1 0 224,15 0 0,0 0-224,-18 0 0,0 0 0,17 0 0,2 0 0,-1 0 0,-4 0 0,-8 0 0,-7-1 0,1 0 0,7-1 0,2-1 0,-1 0 0,-3 1 0,1 1 0,3-2 0,-5-1 0,11 0 0,17 3 0,7 1 0,0 0 0,7 0 0,-3-3 0,-1-4 0,-6-4 0,-10-5 0,-4 5 0,-10 2 0,2 5 0,-9 1 0,-3 0 0,3 1 0,-5-2 0,0 0 0,-3 1 0,-3 1 0,-5 1 0,-1 1 0,3 2 0,11 1 0,2 0 0,0 2 0,0 1 0,1 0 0,0 2 0,0 0 0,1-1 0,-14 2 0,1 0 0,3 1 0,13-1 0,3 0 0,7-2 0,-15-2 0,20-5 0,15 0 0,9 0 0,6 0 0,2 0 0,-6 0 0,-52 0 0,18 0 0,2 0 0,0 0 0,-10 0 0,0 0 0,-13 0 0,15 0 0,1 0 0,27 0 0,14 0 0,1-1 0,0-1 0,-9 0 0,1 0 0,-2 2 0,1 0 0,4 0 0,4 0 0,4 0 0,1 0 0,1 0 0,-16 0 0,-6 0 0,-8 0 0,12 0 0,5 0 0,10-3 0,-6-2 0,5 0 0,4 1 0,3 3 0</inkml:trace>
+  <inkml:trace contextRef="#ctx0" brushRef="#br0" timeOffset="5758">4145 10575 24575,'-12'0'0,"-39"0"0,8 0 0,-15 0 0,-9-2 0,3-2 0,-3-2 0,8 2 0,-4-1 0,-1 0 0,-4-3 0,-1 0 0,0 0 0,-1 0 0,0 1 0,0 0 0,-2 2 0,-1 0 0,1 0 0,4 0 0,1 1 0,3 1 0,12 1 0,2 1 0,2 0 0,-16-1 0,6 0 0,-12 1 0,28-1 0,-1 5 0,-6 17 0,2 6 0,10-13 0,3 4 0,-4 17 0,8 4 0,5 10 0,-4 19 0,16-32 0,3 3 0,-1 15 0,3 2 0,2-8 0,4-1 0,1-3 0,3-2 0,6 21 0,10-21 0,11 6 0,5-3 0,8 3 0,-8-12 0,4 2 0,2-1 0,11 6 0,3 0 0,0-2 0,-4-6 0,-1-2 0,2-4 0,-4-6 0,2-3 0,2-3 0,12-3 0,4-3 0,2 0 0,-11-2 0,1 1 0,3-1 0,2 0 0,-2 1 0,4-1 0,1 0 0,-1 0 0,-1 1-395,6 1 1,-1 0 0,-1 0-1,-2 1 395,-2 0 0,0 1 0,-2 0 0,-3 0 0,2 2 0,-3 0 0,-1 1-259,1 1 0,0 1 0,0 0 259,0 0 0,1-1 0,0 0 0,2-1 0,1 0 0,1-1 0,1 0 0,0-2 0,1 0 0,2-1 0,0-2 0,2 0-486,3 0 0,1-1 0,1 0 486,-15-3 0,0-1 0,2 0 0,5 0 0,-6-2 0,4 0 0,2 0 0,2 0 0,1-1 0,-1 0 0,3 0 0,1 0 0,1 0 0,1-1 0,-1 0 0,0 1 0,-1-1 0,0 0 0,0 0 0,0 0 0,2 0 0,0 0 0,-1 0 0,3 0 0,1 0 0,0 0 0,-2 0 0,-3 0 0,-6 0 0,10 0 0,-6 0 0,-2 0 0,5 0-335,-1 0 1,4 0-1,1 0 1,-3 0-1,-5 0 335,-8 0 0,-4-1 0,-2 1 0,1 1 0,16-1 0,0 1 0,-1 0 132,-2 1 1,-2 0 0,1 0-133,-2 0 0,0 1 0,0-1 0,0 0 0,0 0 0,0 0 0,0-1 0,0 0 0,0 0 0,-4-1 0,0 0 0,0 0 0,-4 0 0,0 0 0,-1 0 158,-5-1 1,0 1-1,-1 1-158,19 0 0,-2 1 694,-6 2 0,1 2-694,-11 0 0,1 3 0,-4 0 0,5 1 0,-1 1 963,14 4 0,-2-1-963,-24-5 0,-1-1 531,20 3 1,1-2-532,-15-4 0,4-1 0,7 0 0,7-1 0,-6-1 0,-4-1 0,-1-2 118,18 1 0,5 0-118,-19 4 0,2 2 0,-3-1 0,11-1 0,2 0-1213,-5 1 0,3 1 0,-4-1 1213,-1-2 0,-2-1-107,9-4 1,1-1 106,-6-1 0,3-1 0,-6-1 0,5 0 0,1-1-370,-12 2 1,0 0-1,2 0 1,1-1 369,6 1 0,2 0 0,0 0 0,-1 0 0,0 0 0,-1 1 0,0 0 0,-1 0 0,-7 0 0,-1 1 0,0 0 0,1-1 0,2 1 0,2-2 0,-1 1 0,-4 0 1091,2-1 0,-4 0 0,1-2-1091,3 0 0,0-2 0,-6-3 118,1-6 1,-6-6-119,-5-6 0,-3-4 910,-8 4 0,-3-1-910,0 0 0,-2 1 0,5-5 0,-9 9 0,-8 5 0,-6 2 0,-5-5 0,-3-5 0,-17-33 0,-6 13 0,-4-3 0,-8-13 0,-1-1 0,-1 7 0,-1 3 0,3 5 0,3 6 0,-11-5 0,-4 7 0,-4 3 0,-2 8 0,-4-1 0,13 8 0,0-1 0,-22-9 0,1 0 0,16 10 0,3 3 0,3 0 0,-4 1 0,-1 5 0,-5 1 0,2 1 0,-9-1 0,-1 2 0,7 3 0,-3 1 0,2 1 0,-8 3 0,2 1 0,3 0 0,-4 1 0,1 1 0,-4 0 0,1 0 0,13 1 0,1 0 0,-3 0-216,-17-1 0,-4 2 0,4-1 216,16 1 0,3 0 0,0 0 0,-3 0 0,0 0 0,0 0 0,2 0 0,-1 0 0,0 0 0,2 0 0,0 0 0,0 0 0,-2 0 0,0 0 0,0 0 0,-21 0 0,1 0 0,21 0 0,0 0 0,0 0 0,-1 0 0,0-1 0,-1 0 0,-1 0 0,0 0 0,-1 0 0,-3 0 0,0-1 0,0 0 0,3-1 0,1 0 0,-1 1 0,-1-1 0,-1 1 0,-4 0 0,0 1 0,-4-1 0,-1 1 0,3 0 0,-6 0 0,2 0 0,-3 1-319,3 0 1,-4 0 0,1 0 0,4 0 318,0 0 0,4 0 0,1 0 0,3 0 0,0 1 0,-4-2 0,-2-2 0,-5-1 0,1 0 0,6 0 0,7 1 0,5-1 0,-3 0-7,-20-3 0,-3-1 0,10 0 7,20 1 0,4 1 0,-11-4 0,1 0 0,15 4 0,0 0 302,-7-2 1,-5 0-303,-9-1 0,-8 0 0,3 2 0,-8 0 0,-2 1 0,5-2 0,-5 0 0,7 2 0,-2 2 0,8 1 656,14 0 1,-1 0-657,-2 1 0,-4-1 0,1 1 0,-10 0 0,0 0 0,9 1 0,-3-1 0,-2 0 0,-14 0 0,-3 1 0,5 1 0,0-1 0,-1-1 8,2 1 0,-6-1 0,5 0-8,16 1 0,4 1 0,0-1 0,0 0 0,0 0 0,0 0 0,-24 0 0,3 0 0,9 1 0,3 0 0,3 0 0,1 0 0,-3 0 0,-2 0 0,10 0 0,-1 0 0,2 0 0,-8 0 0,2 0 0,3 0 0,3 0 0,-19 0 0,16 0 0,-2 0 0,11 0 0,-3 0 0,-3 0 0,-7 0 0,3 0 0,-17 0 0,2 0 0,-1 0 0,2 0 0,4 0 0,4 0 0,10 0 0,3 0 0,-19 0 0,10 0 0,34 0 0,19 0 0,1 0 0</inkml:trace>
+  <inkml:trace contextRef="#ctx0" brushRef="#br0" timeOffset="14470">5899 14792 24575,'-38'0'0,"0"0"0,-26 0 0,3 0 0,-2 0 0,13 0 0,0 0 0,-24 0 0,0 0 0,20 0 0,1 0 0,-13 0 0,1 0 0,11 0 0,1 0 0,-2 0 0,-1 0 0,3-1 0,1 0 0,5 0 0,0-1 0,-2-3 0,1-3 0,9 1 0,-1-2 0,-17-1 0,-2 0 0,8 1 0,1 1 0,7 3 0,-1 0 0,-4 1 0,0 1 0,8 0 0,1 1 0,-3-1 0,0 1 0,-2 1 0,0 0 0,-2 1 0,-4 0 0,-2 1 0,-4 0 0,-1 2 0,3 1 0,-1 1 0,-1 0 0,-8 1 0,-2 1 0,2 0 0,11 0 0,2 1 0,2 0 0,-16 2 0,2 0 0,0 1 0,1-1 0,3 1 0,1 1 0,7 0 0,3 1 0,-19 14 0,30-8 0,15 0 0,6-7 0,-1 3 0,-5 12 0,8-8 0,0 7 0,1 16 0,3-10 0,-2 5 0,-1 0 0,1 1 0,-5 7 0,11-17 0,2-3 0,3 16 0,1 6 0,0 3 0,0 22 0,0-5 0,0-2 0,0-11 0,0 1 0,0-22 0,4 15 0,5-27 0,3 2 0,5 0 0,3 0 0,25 11 0,-10-9 0,8 13 0,-16-5 0,5-2 0,23-10 0,7-3 0,-3 10 0,4-3 0,-8-16 0,4-5 0,-3 0 0,9 3 0,-3 2 0,0 3 0,-1 2 0,0 2 0,-1 1 0,0-1 0,0-1 0,-5-3 0,2-2 0,-4-5 0,5 0 0,0-2 0,1 0 0,2 0 0,6-2 0,-8 0 0,4-2 0,4 0 0,0 0 0,-1 1 0,1-1 0,-1 1 0,1 0 0,0-1 0,-1 1-399,-1-1 0,1 0 0,-1 0 0,-1 0 1,0 0 398,11 1 0,-1-1 0,-1 1 0,-4 0 0,5 0 0,-4 0 0,-1 0-338,2 0 1,-1 0-1,0 0 338,0 0 0,1 0 0,-2 0 0,-6 0 0,-2 0 0,5 0 0,-2 0 0,5 0 0,0 0 0,-4 0 0,4 0 0,-3 0 0,2 0 0,-3 0 0,3 0 0,0 0 0,-5 0 0,-2 0 0,-4 0 0,1 0 0,2 0 0,1 0 0,-1 0 0,0 0 0,-1 0 0,0 0 0,1 0 0,0 0 0,0 0 0,2 0 0,1 0 0,-1 0 0,-1 0 0,-1 0 0,1 0 0,-1 0 0,1 0 0,4 0-65,-1 0 0,3 0 0,2 0 0,0 0 65,4 0 0,0 0 0,2 0 0,2 0 0,-17 0 0,2 0 0,1 0 0,1 0 0,-1 0 0,1 0 0,-2 0 0,-1 0 0,0 0 0,2 0 0,2 0 0,5 0 0,-4 0 0,6 0 0,4 0 0,2 0 0,1 0 0,-1 0 0,-3 0 0,-3 0 0,-6 0 0,13 0 0,-7 0 0,-2 0 0,1 0 0,8 0-109,-14 0 1,7 0 0,3 0 0,3 0 0,-1 0 0,-1 0 0,-6 0 0,-5 0 0,-10 0 108,17 0 0,-12 0 0,2 0 0,-2 0 0,2 0 0,-1 0 0,-5 0 470,13 0 0,-5 0-470,-5 0 0,-1 0 130,-3 0 1,-3 0-131,-14 0 0,-1 0 0,5 0 0,0-2 0,1 0 0,7-1 0,5-1 0,10-2 0,1 0 0,-5 0 0,-5 2 0,-4 1 0,5-1 614,8-1 1,6-1 0,-1 0 0,-9 2-615,2 2 0,-5 1 0,2 0 0,0 1 0,-2 0 0,-1 0 0,-4-1 0,0 0 0,9-3 0,-2-2 0,-20 1 0,-1-2 0,7-1 0,-4-2 580,0-5-580,0-6 0,-8-6 0,0-1 0,-7-6 0,-2 5 0,1 2 0,4-1 0,-1 3 0,12-13 0,-8 4 0,-1-1 0,-16 6 0,-11-7 0,-4-3 0,-1 0 0,0 11 0,0 16 0,-3 3 0,-9-6 0,-13-5 0,-17-12 0,-15-9 0,22 16 0,-1 0 0,-5-2 0,-2 0 0,-10-2 0,-2 2 0,0 1 0,-6 0 0,6 8 0,-8-2 0,-1 2 0,6 0 0,6 3 0,4 0 0,-4 0 0,-3-1 0,-5 0 0,-1-1 0,5 0 0,-4-1 0,4 0 0,-1 0 0,-6 1 0,-1 1 0,-2-1 0,10 1 0,-1-1 0,-1 1 0,1 2 0,-15-1 0,1 2 0,5 1 0,-7-3 0,6 3 0,10 5 0,4 3 0,8 3 0,1 0 0,-5 1 0,-1 0 0,0 0 0,0 0 0,-5 0 0,1 0 0,7 0 0,1 0 0,-7 0 0,-5 0 0,2 2 0,-4 1 0,0-1 0,2 0 0,0-1 0,-1 0 0,-11 2 0,-3-1 0,4 1 0,-6-2 0,4 0 0,10-1 0,-3 0 0,1-1 0,-4 0 0,4 1 0,1-2 0,-1 1 0,-5 0 0,-7 0 0,8 0 0,8-1 0,4 0 0,-6 1 0,-4-1 0,2-1 0,-5-2 0,3 0 0,14 2 0,1 0 0,-2-1 0,-16 0 0,-3-1 0,-3-1 0,11 2 0,-2-2 0,1 1 0,4 0 0,3 0 0,5 1 0,-4-1 0,1 0 0,-4-1 0,0 1 0,3-3 0,-6-2 0,3-3 0,1 2 0,7 1 0,2 1 0,-1 0 0,-9-3 0,-1 0 0,3 1 0,-11 0 0,2 1 0,16 2 0,-2 0 0,2 1 0,-8-2 0,-2 0 0,9 0 0,-2 1 0,0 0 0,3 3 0,0 1 0,0 0 0,-23-2 0,1 1 0,1 3 0,2 0 0,10 0 0,6-1 0,-9 1 0,4-2 0,-3-3 0,12 3 0,-2-1 0,11 1 0,-1 0 0,-26-1 0,1 2 0,28 1 0,1 1 0,-8 0 0,0 0 0,-28 8 0,24 0 0,-8 4 0,27 0 0,5-3 0,4 0 0,6-2 0,7-2 0,-1 0 0,5 0 0,-3 3 0,-3 5 0,3-1 0,0-3 0,6-4 0</inkml:trace>
+</inkml:ink>
+</file>
+
+<file path=ppt/ink/ink2.xml><?xml version="1.0" encoding="utf-8"?>
+<inkml:ink xmlns:inkml="http://www.w3.org/2003/InkML">
+  <inkml:definitions>
+    <inkml:context xml:id="ctx0">
+      <inkml:inkSource xml:id="inkSrc0">
+        <inkml:traceFormat>
+          <inkml:channel name="X" type="integer" min="-2.14748E9" max="2.14748E9" units="cm"/>
+          <inkml:channel name="Y" type="integer" min="-2.14748E9" max="2.14748E9" units="cm"/>
+          <inkml:channel name="F" type="integer" max="32767" units="dev"/>
+        </inkml:traceFormat>
+        <inkml:channelProperties>
+          <inkml:channelProperty channel="X" name="resolution" value="1000" units="1/cm"/>
+          <inkml:channelProperty channel="Y" name="resolution" value="1000" units="1/cm"/>
+          <inkml:channelProperty channel="F" name="resolution" value="0" units="1/dev"/>
+        </inkml:channelProperties>
+      </inkml:inkSource>
+      <inkml:timestamp xml:id="ts0" timeString="2023-09-14T12:46:47.875"/>
+    </inkml:context>
+    <inkml:brush xml:id="br0">
+      <inkml:brushProperty name="width" value="0.05292" units="cm"/>
+      <inkml:brushProperty name="height" value="0.05292" units="cm"/>
+      <inkml:brushProperty name="color" value="#0070C0"/>
+    </inkml:brush>
+  </inkml:definitions>
+  <inkml:trace contextRef="#ctx0" brushRef="#br0">1851 8756 24575,'-28'0'0,"8"0"0,-11 0 0,-10 7 0,9 6 0,-15 6 0,19 1 0,5-4 0,7-2 0,6-6 0,-3 9 0,-11 13 0,-2 5 0,-7 15 0,1-2 0,2 3 0,13-16 0,3 0 0,-2 4 0,-1 0 0,0 1 0,0 0 0,0-2 0,1-2 0,-13 30 0,8-16 0,0 6 0,6-8 0,2 2 0,-1 4 0,-2 14 0,0 6 0,2-2 0,2-2 0,2-1 0,1 0-268,2 1 1,3 0-1,1-3 268,1-10 0,2-3 0,-1 1 0,1 4 0,0 1 0,0 5 0,1-8 0,-1 4 0,1 2 0,1 0 0,0-2 0,2 6 0,1-2 0,0 0 0,1 5 0,0 0 0,0 4 0,1 2 0,0-1 0,3-1 0,2-2 0,1 0 0,2-1 0,0-2 0,1-2 0,2 1 0,2-4 0,-1 0 0,-1-1 0,-3 0 0,-1 1 0,0-3 0,1-5 0,10 16 0,-1-6-100,-10-11 0,-1 1 100,5 12 0,3 1 0,-6-22 0,2 1 0,1 2 0,2 3 0,3 3 0,0 0 0,-1-3 0,2 1 0,-1-4 0,3 3-162,-2-2 1,2 2 0,1 0 0,0-5 161,1-3 0,-1-4 0,1 0 0,14 19 0,2 1 0,-7-15 0,2 2 0,1-2 0,0-2 0,1-1 0,2 2 0,-3-3 0,2 3 0,1 0 0,-2-3 0,4 3 0,0-2 0,-1 1 20,5 5 0,1 2 0,-3-3-20,-7-9 0,-2-2 0,1 0 0,4 2 0,1-1 0,0-1 0,1-2 0,1-1 0,-1 0 0,1-2 0,0 0 0,0-2 0,-2-1 0,0-2 0,-1 0 74,17 10 0,-1 0-74,-2-2 0,-1-1 0,-3-2 0,-2-3 0,-8-2 0,-3-3 652,20 9-652,-7-11 0,-18-9 0,9 2 0,6 2 0,13 4 0,6 2 0,2 0 0,-4-2-807,-7-4 0,-2-2 0,0 0 0,4 1 0,5 0 807,-5 0 0,4 1 0,3 1 0,2 1 0,2-1 0,1-1 0,1-1 0,0-2 0,-10-3 0,2-1 0,1 0 0,0-2 0,2 0 0,-1-1 0,0 0 0,-1 0 0,-1 0 0,-1 0 0,7 0 0,-2 1 0,0-2 0,-2 1 0,1-1 0,1 0 0,0 1 0,3-1 0,-7-1 0,2 0 0,2 1 0,0-1 0,1 0 0,-1 0 0,0 0 0,-1-1 0,-2 0 0,-2 0 0,4 0 0,-1-1 0,0 0 0,-2 0 0,-1 0 0,-2-1 0,-2 0 0,-3 0 117,10 0 1,-5 0-1,-2 0 1,-1 0-1,1 0-117,11 0 0,-2 0 0,2 1 0,6 0 0,-15 2 0,4 0 0,4 1 0,0 0 0,1 0 0,-1-3 0,-3-3-431,0-2 1,-4-2 0,-1-2 0,3-1 0,4-2 0,7-2 430,-19 3 0,4-1 0,4-2 0,4 0 0,2 0 0,2-2 0,1 0 0,1 0 0,-1-1 0,0-1 0,-3 0 0,-1 0 0,-4 0 0,-4 0-329,11-4 1,-3-1 0,-3 0-1,-2 0 1,-1-1 0,-1-1 0,2-1-1,0-1 1,3-2 328,-4 2 0,2-3 0,3-2 0,1 0 0,0-2 0,-1 1 0,-2 0 0,-2 1 0,-4 1 0,-4 3 0,-5 2 403,10-5 1,-7 2 0,-4 2 0,-1 2-1,0 0-403,9-2 0,0 2 0,-2 0 0,0 2 0,-3 1 0,-2 2 0,1 0 0,0-3 0,1-1 0,0-2 0,1-2 0,4-3-327,-5 2 0,4-3 0,3-1 0,-1-2 0,-1 0 0,-3-1 327,4-5 0,-3-1 0,-2-2 0,0 0 0,-2 1 0,-4 2 0,-1 0 0,-1-1 0,-1 1 0,-1-2 412,0-1 1,1-2 0,-2 0 0,-3 2 0,-5 4-413,2-1 0,-6 3 0,-1-1 1770,15-18 0,-9 2-1770,-13-15 0,0 18 0,10-14 0,5-6 0,0 1 0,-5 7 0,0-5 0,-3 6 0,4-7-43,-4 12 0,5-7 0,3-2 0,-2 0 0,-2 5 0,-8 8 43,10-16 0,-9 5 979,-10 10 0,-3-2 1,-3-3-980,-4-6 0,-4-2 0,-1-3 0,-1 7 0,0-2 0,-2-1 0,0 0 0,-2 1 0,-1 0 0,0 0 0,0 1 0,0 4 0,1 0 0,-1 1 0,0 1 0,0-18 0,0 0 0,1 1 0,0-1 0,1 1 0,0 2 0,1 6 0,1 3 0,0 0 477,1 4 0,0 1 1,2 2-478,6-20 0,1 2 0,-2 5 0,-1 2 0,1 3 0,-1 3 0,-3 12 0,-2 6 0,0 2 0,-2 15 0,3-18 0,15-24 0,3 11 0,6-10 0,-2 5 0,0-1 0,0 1 0,1 2 0,4-4 0,-7 10 0,0-9 0,-17 18 0,-3-1 0,-2 8 0,-1-2 0,-2-16 0,0-1 0,-1 10 0,0 0 0,0 0 0,0 1 0,0 5 0,0 3 0,-1-25 0,-3 16 0,-5 13 0,-19-9 0,7 17 0,-16-16 0,11 14 0,-5-6 0,0 0 0,-4-4 0,-10-3 0,-3 0 0,-1-2 0,-2 2 0,-4 2 0,0 7 0,13 15 0,2 3 0,-3 1 0,0 2 0,0 2 0,-2 1 0,3 1 0,-4 2 0,-3 0 0,-5 2 0,-5 1 0,3 1 0,-5 0 0,-2 2 0,-1 0 0,3-1 0,-3 2 0,3-1 0,-1 2 0,-6 0-159,2 0 1,-6 1 0,-4 0-1,0 1 1,2 2 0,4 2 158,-1 2 0,4 4 0,0 0 0,1 1 0,-1-1-510,-1 0 0,0 0 0,0 1 0,0 0 0,0 1 510,-2 2 0,-1 2 0,0 0 0,1 0 0,0-2 0,2-1 0,2-1 0,-1 0 0,1-2 0,0-1-77,2-3 1,1-2-1,1-1 1,-2 0-1,-1 0 77,-7 0 0,-3 0 0,0-1 0,1-1 0,2-2 0,-6-1 0,2-2 0,2-1 0,4 0 0,-6 0 0,4 0 0,3 0 0,9 0 0,3 0 0,3-1 0,-15 0 0,7 0 0,-13 2 0,35-2 0,0-5 0,-3-16 0,-5-7 269,-10 1 0,-9-1 1,-7-2-270,17 8 0,-6-1 0,-3 0 0,-1-1 0,0 1 0,3 3 0,-4-1 0,2 2 0,0 0 0,0 2 0,-3 1 53,4 1 0,-3 1 0,0 0 1,0 2-1,2 1 0,5 3-53,-5 3 0,5 3 0,1 1 0,-1 0 0,-4 0 0,0 0 0,-2 1 0,-5 1-118,9 1 0,-4 0 1,-3 2-1,-1 0 1,1 2-1,0 1 118,1 2 0,0 1 0,0 2 0,0 1 0,1-1 0,-1 0 0,1 0 0,-1-1 0,0 0 0,1 0 0,2 2 0,1 1 0,-2 3 0,2 2 0,1 1 0,2-1 0,0-1 0,-5-1 0,1-2 0,3 0 0,2-2 0,-1-1 0,4-1 0,-3-1 0,-13 1 0,-3-2 0,5-3-124,-1-2 1,3-3 123,-1 1 0,-2-2 0,12-3 0,-3-1 0,-3-2 0,3 1 0,-4 0 0,0-1 0,-1 0 0,1 0 0,-1 0 0,1 1 0,0-1 542,1 0 1,0 0 0,1 0-1,0 1-542,1 2 0,0 1 0,3 1 0,5 0 0,-14-1 0,3 0 0,12 1 0,-1 0 0,2 1 621,-6 2-1,5 0-620,17-1 0,1-1 149,-6 2 0,2-1-149,-8-9 0,-6-7 0,-12-13 0,32 11 0,-4-1 0,-26-8 0,-4 1 0,16 7 0,-1 2 0,5 4 0,-3 0 0,2 4 0,-7 2 0,1 3 0,-1 2 0,0 1 0,0 0 0,1 1 0,3 1 0,1 1 0,0 2 0,3 0 0,-7 3 0,7 1 0,29-8 0,-12-1 0,-15 0 0,-2 0 0,5 0 0,10 0 0,4 2 0,2 3 0,0 4 0,1 1 0,4-1 0,4-2 0,1-1 0,-1-3 0,-5-2 0,-13 0 0,11 1 0,-4 1 0,22 2 0,4-1 0,3 16 0,2-13 0,0 9 0</inkml:trace>
+</inkml:ink>
+</file>
+
 <file path=ppt/notesMasters/notesMaster1.xml><?xml version="1.0" encoding="utf-8"?>
 <p:notesMaster xmlns:a="http://schemas.openxmlformats.org/drawingml/2006/main" xmlns:r="http://schemas.openxmlformats.org/officeDocument/2006/relationships" xmlns:p="http://schemas.openxmlformats.org/presentationml/2006/main">
   <p:cSld>
@@ -220,7 +281,7 @@
           <a:p>
             <a:fld id="{E5193872-D41B-4988-B8AB-8B78793D6A51}" type="datetimeFigureOut">
               <a:rPr lang="en-US" smtClean="0"/>
-              <a:t>9/17/20</a:t>
+              <a:t>9/21/23</a:t>
             </a:fld>
             <a:endParaRPr lang="en-US"/>
           </a:p>
@@ -1005,7 +1066,7 @@
           <a:p>
             <a:fld id="{6A19798E-888E-4E30-8750-31BF8AE3A41F}" type="datetimeFigureOut">
               <a:rPr lang="en-US" smtClean="0"/>
-              <a:t>9/17/20</a:t>
+              <a:t>9/21/23</a:t>
             </a:fld>
             <a:endParaRPr lang="en-US"/>
           </a:p>
@@ -1173,7 +1234,7 @@
           <a:p>
             <a:fld id="{6A19798E-888E-4E30-8750-31BF8AE3A41F}" type="datetimeFigureOut">
               <a:rPr lang="en-US" smtClean="0"/>
-              <a:t>9/17/20</a:t>
+              <a:t>9/21/23</a:t>
             </a:fld>
             <a:endParaRPr lang="en-US"/>
           </a:p>
@@ -1351,7 +1412,7 @@
           <a:p>
             <a:fld id="{6A19798E-888E-4E30-8750-31BF8AE3A41F}" type="datetimeFigureOut">
               <a:rPr lang="en-US" smtClean="0"/>
-              <a:t>9/17/20</a:t>
+              <a:t>9/21/23</a:t>
             </a:fld>
             <a:endParaRPr lang="en-US"/>
           </a:p>
@@ -1519,7 +1580,7 @@
           <a:p>
             <a:fld id="{6A19798E-888E-4E30-8750-31BF8AE3A41F}" type="datetimeFigureOut">
               <a:rPr lang="en-US" smtClean="0"/>
-              <a:t>9/17/20</a:t>
+              <a:t>9/21/23</a:t>
             </a:fld>
             <a:endParaRPr lang="en-US"/>
           </a:p>
@@ -1764,7 +1825,7 @@
           <a:p>
             <a:fld id="{6A19798E-888E-4E30-8750-31BF8AE3A41F}" type="datetimeFigureOut">
               <a:rPr lang="en-US" smtClean="0"/>
-              <a:t>9/17/20</a:t>
+              <a:t>9/21/23</a:t>
             </a:fld>
             <a:endParaRPr lang="en-US"/>
           </a:p>
@@ -2049,7 +2110,7 @@
           <a:p>
             <a:fld id="{6A19798E-888E-4E30-8750-31BF8AE3A41F}" type="datetimeFigureOut">
               <a:rPr lang="en-US" smtClean="0"/>
-              <a:t>9/17/20</a:t>
+              <a:t>9/21/23</a:t>
             </a:fld>
             <a:endParaRPr lang="en-US"/>
           </a:p>
@@ -2468,7 +2529,7 @@
           <a:p>
             <a:fld id="{6A19798E-888E-4E30-8750-31BF8AE3A41F}" type="datetimeFigureOut">
               <a:rPr lang="en-US" smtClean="0"/>
-              <a:t>9/17/20</a:t>
+              <a:t>9/21/23</a:t>
             </a:fld>
             <a:endParaRPr lang="en-US"/>
           </a:p>
@@ -2585,7 +2646,7 @@
           <a:p>
             <a:fld id="{6A19798E-888E-4E30-8750-31BF8AE3A41F}" type="datetimeFigureOut">
               <a:rPr lang="en-US" smtClean="0"/>
-              <a:t>9/17/20</a:t>
+              <a:t>9/21/23</a:t>
             </a:fld>
             <a:endParaRPr lang="en-US"/>
           </a:p>
@@ -2680,7 +2741,7 @@
           <a:p>
             <a:fld id="{6A19798E-888E-4E30-8750-31BF8AE3A41F}" type="datetimeFigureOut">
               <a:rPr lang="en-US" smtClean="0"/>
-              <a:t>9/17/20</a:t>
+              <a:t>9/21/23</a:t>
             </a:fld>
             <a:endParaRPr lang="en-US"/>
           </a:p>
@@ -2955,7 +3016,7 @@
           <a:p>
             <a:fld id="{6A19798E-888E-4E30-8750-31BF8AE3A41F}" type="datetimeFigureOut">
               <a:rPr lang="en-US" smtClean="0"/>
-              <a:t>9/17/20</a:t>
+              <a:t>9/21/23</a:t>
             </a:fld>
             <a:endParaRPr lang="en-US"/>
           </a:p>
@@ -3207,7 +3268,7 @@
           <a:p>
             <a:fld id="{6A19798E-888E-4E30-8750-31BF8AE3A41F}" type="datetimeFigureOut">
               <a:rPr lang="en-US" smtClean="0"/>
-              <a:t>9/17/20</a:t>
+              <a:t>9/21/23</a:t>
             </a:fld>
             <a:endParaRPr lang="en-US"/>
           </a:p>
@@ -3418,7 +3479,7 @@
           <a:p>
             <a:fld id="{6A19798E-888E-4E30-8750-31BF8AE3A41F}" type="datetimeFigureOut">
               <a:rPr lang="en-US" smtClean="0"/>
-              <a:t>9/17/20</a:t>
+              <a:t>9/21/23</a:t>
             </a:fld>
             <a:endParaRPr lang="en-US"/>
           </a:p>
@@ -7618,6 +7679,57 @@
           </a:p>
         </p:txBody>
       </p:sp>
+      <mc:AlternateContent xmlns:mc="http://schemas.openxmlformats.org/markup-compatibility/2006" xmlns:p14="http://schemas.microsoft.com/office/powerpoint/2010/main">
+        <mc:Choice Requires="p14">
+          <p:contentPart p14:bwMode="auto" r:id="rId3">
+            <p14:nvContentPartPr>
+              <p14:cNvPr id="4" name="Ink 3">
+                <a:extLst>
+                  <a:ext uri="{FF2B5EF4-FFF2-40B4-BE49-F238E27FC236}">
+                    <a16:creationId xmlns:a16="http://schemas.microsoft.com/office/drawing/2014/main" id="{65BAB8C7-A5CD-146F-CC2E-178C76B25AA5}"/>
+                  </a:ext>
+                </a:extLst>
+              </p14:cNvPr>
+              <p14:cNvContentPartPr/>
+              <p14:nvPr/>
+            </p14:nvContentPartPr>
+            <p14:xfrm>
+              <a:off x="700920" y="2862000"/>
+              <a:ext cx="4443480" cy="3017880"/>
+            </p14:xfrm>
+          </p:contentPart>
+        </mc:Choice>
+        <mc:Fallback xmlns="">
+          <p:pic>
+            <p:nvPicPr>
+              <p:cNvPr id="4" name="Ink 3">
+                <a:extLst>
+                  <a:ext uri="{FF2B5EF4-FFF2-40B4-BE49-F238E27FC236}">
+                    <a16:creationId xmlns:a16="http://schemas.microsoft.com/office/drawing/2014/main" id="{65BAB8C7-A5CD-146F-CC2E-178C76B25AA5}"/>
+                  </a:ext>
+                </a:extLst>
+              </p:cNvPr>
+              <p:cNvPicPr/>
+              <p:nvPr/>
+            </p:nvPicPr>
+            <p:blipFill>
+              <a:blip r:embed="rId4"/>
+              <a:stretch>
+                <a:fillRect/>
+              </a:stretch>
+            </p:blipFill>
+            <p:spPr>
+              <a:xfrm>
+                <a:off x="691560" y="2852640"/>
+                <a:ext cx="4462200" cy="3036600"/>
+              </a:xfrm>
+              <a:prstGeom prst="rect">
+                <a:avLst/>
+              </a:prstGeom>
+            </p:spPr>
+          </p:pic>
+        </mc:Fallback>
+      </mc:AlternateContent>
     </p:spTree>
     <p:extLst>
       <p:ext uri="{BB962C8B-B14F-4D97-AF65-F5344CB8AC3E}">
@@ -7929,13 +8041,13 @@
           <p:nvPr>
             <p:extLst>
               <p:ext uri="{D42A27DB-BD31-4B8C-83A1-F6EECF244321}">
-                <p14:modId xmlns:p14="http://schemas.microsoft.com/office/powerpoint/2010/main" val="2094992266"/>
+                <p14:modId xmlns:p14="http://schemas.microsoft.com/office/powerpoint/2010/main" val="1618714411"/>
               </p:ext>
             </p:extLst>
           </p:nvPr>
         </p:nvGraphicFramePr>
         <p:xfrm>
-          <a:off x="5105400" y="3126509"/>
+          <a:off x="5353833" y="3112479"/>
           <a:ext cx="3581400" cy="2621280"/>
         </p:xfrm>
         <a:graphic>
@@ -8001,7 +8113,7 @@
                             <a:schemeClr val="tx1"/>
                           </a:solidFill>
                         </a:rPr>
-                        <a:t>     </a:t>
+                        <a:t> \  </a:t>
                       </a:r>
                       <a:r>
                         <a:rPr lang="en-US" b="1" dirty="0">
@@ -9097,41 +9209,6 @@
           </a:graphicData>
         </a:graphic>
       </p:graphicFrame>
-      <p:cxnSp>
-        <p:nvCxnSpPr>
-          <p:cNvPr id="7" name="Straight Connector 6"/>
-          <p:cNvCxnSpPr/>
-          <p:nvPr/>
-        </p:nvCxnSpPr>
-        <p:spPr>
-          <a:xfrm>
-            <a:off x="5257800" y="3163454"/>
-            <a:ext cx="304800" cy="304800"/>
-          </a:xfrm>
-          <a:prstGeom prst="line">
-            <a:avLst/>
-          </a:prstGeom>
-          <a:ln>
-            <a:solidFill>
-              <a:schemeClr val="tx1"/>
-            </a:solidFill>
-          </a:ln>
-        </p:spPr>
-        <p:style>
-          <a:lnRef idx="1">
-            <a:schemeClr val="accent1"/>
-          </a:lnRef>
-          <a:fillRef idx="0">
-            <a:schemeClr val="accent1"/>
-          </a:fillRef>
-          <a:effectRef idx="0">
-            <a:schemeClr val="accent1"/>
-          </a:effectRef>
-          <a:fontRef idx="minor">
-            <a:schemeClr val="tx1"/>
-          </a:fontRef>
-        </p:style>
-      </p:cxnSp>
       <p:sp>
         <p:nvSpPr>
           <p:cNvPr id="16" name="TextBox 15"/>
@@ -9199,10 +9276,2329 @@
           </a:p>
         </p:txBody>
       </p:sp>
+      <mc:AlternateContent xmlns:mc="http://schemas.openxmlformats.org/markup-compatibility/2006" xmlns:p14="http://schemas.microsoft.com/office/powerpoint/2010/main">
+        <mc:Choice Requires="p14">
+          <p:contentPart p14:bwMode="auto" r:id="rId2">
+            <p14:nvContentPartPr>
+              <p14:cNvPr id="4" name="Ink 3">
+                <a:extLst>
+                  <a:ext uri="{FF2B5EF4-FFF2-40B4-BE49-F238E27FC236}">
+                    <a16:creationId xmlns:a16="http://schemas.microsoft.com/office/drawing/2014/main" id="{AFD25595-E523-1EA8-8DEB-E1E375CA39B8}"/>
+                  </a:ext>
+                </a:extLst>
+              </p14:cNvPr>
+              <p14:cNvContentPartPr/>
+              <p14:nvPr/>
+            </p14:nvContentPartPr>
+            <p14:xfrm>
+              <a:off x="388440" y="3064680"/>
+              <a:ext cx="4932000" cy="2691720"/>
+            </p14:xfrm>
+          </p:contentPart>
+        </mc:Choice>
+        <mc:Fallback xmlns="">
+          <p:pic>
+            <p:nvPicPr>
+              <p:cNvPr id="4" name="Ink 3">
+                <a:extLst>
+                  <a:ext uri="{FF2B5EF4-FFF2-40B4-BE49-F238E27FC236}">
+                    <a16:creationId xmlns:a16="http://schemas.microsoft.com/office/drawing/2014/main" id="{AFD25595-E523-1EA8-8DEB-E1E375CA39B8}"/>
+                  </a:ext>
+                </a:extLst>
+              </p:cNvPr>
+              <p:cNvPicPr/>
+              <p:nvPr/>
+            </p:nvPicPr>
+            <p:blipFill>
+              <a:blip r:embed="rId3"/>
+              <a:stretch>
+                <a:fillRect/>
+              </a:stretch>
+            </p:blipFill>
+            <p:spPr>
+              <a:xfrm>
+                <a:off x="379080" y="3055320"/>
+                <a:ext cx="4950720" cy="2710440"/>
+              </a:xfrm>
+              <a:prstGeom prst="rect">
+                <a:avLst/>
+              </a:prstGeom>
+            </p:spPr>
+          </p:pic>
+        </mc:Fallback>
+      </mc:AlternateContent>
     </p:spTree>
     <p:extLst>
       <p:ext uri="{BB962C8B-B14F-4D97-AF65-F5344CB8AC3E}">
         <p14:creationId xmlns:p14="http://schemas.microsoft.com/office/powerpoint/2010/main" val="2758387082"/>
+      </p:ext>
+    </p:extLst>
+  </p:cSld>
+  <p:clrMapOvr>
+    <a:masterClrMapping/>
+  </p:clrMapOvr>
+</p:sld>
+</file>
+
+<file path=ppt/slides/slide14.xml><?xml version="1.0" encoding="utf-8"?>
+<p:sld xmlns:a="http://schemas.openxmlformats.org/drawingml/2006/main" xmlns:r="http://schemas.openxmlformats.org/officeDocument/2006/relationships" xmlns:p="http://schemas.openxmlformats.org/presentationml/2006/main">
+  <p:cSld>
+    <p:spTree>
+      <p:nvGrpSpPr>
+        <p:cNvPr id="1" name=""/>
+        <p:cNvGrpSpPr/>
+        <p:nvPr/>
+      </p:nvGrpSpPr>
+      <p:grpSpPr>
+        <a:xfrm>
+          <a:off x="0" y="0"/>
+          <a:ext cx="0" cy="0"/>
+          <a:chOff x="0" y="0"/>
+          <a:chExt cx="0" cy="0"/>
+        </a:xfrm>
+      </p:grpSpPr>
+      <p:sp>
+        <p:nvSpPr>
+          <p:cNvPr id="2" name="Title 1"/>
+          <p:cNvSpPr>
+            <a:spLocks noGrp="1"/>
+          </p:cNvSpPr>
+          <p:nvPr>
+            <p:ph type="title"/>
+          </p:nvPr>
+        </p:nvSpPr>
+        <p:spPr/>
+        <p:txBody>
+          <a:bodyPr>
+            <a:normAutofit/>
+          </a:bodyPr>
+          <a:lstStyle/>
+          <a:p>
+            <a:r>
+              <a:rPr lang="en-US" dirty="0"/>
+              <a:t>Lower triangle</a:t>
+            </a:r>
+          </a:p>
+        </p:txBody>
+      </p:sp>
+      <p:sp>
+        <p:nvSpPr>
+          <p:cNvPr id="3" name="Content Placeholder 2"/>
+          <p:cNvSpPr>
+            <a:spLocks noGrp="1"/>
+          </p:cNvSpPr>
+          <p:nvPr>
+            <p:ph sz="half" idx="1"/>
+          </p:nvPr>
+        </p:nvSpPr>
+        <p:spPr>
+          <a:xfrm>
+            <a:off x="457200" y="1600200"/>
+            <a:ext cx="4343400" cy="4525963"/>
+          </a:xfrm>
+        </p:spPr>
+        <p:txBody>
+          <a:bodyPr>
+            <a:normAutofit fontScale="85000" lnSpcReduction="10000"/>
+          </a:bodyPr>
+          <a:lstStyle/>
+          <a:p>
+            <a:pPr marL="0" indent="0">
+              <a:buNone/>
+            </a:pPr>
+            <a:r>
+              <a:rPr lang="en-US" dirty="0"/>
+              <a:t>Here is a lower triangle of size 4</a:t>
+            </a:r>
+          </a:p>
+          <a:p>
+            <a:pPr marL="0" indent="0">
+              <a:buNone/>
+            </a:pPr>
+            <a:r>
+              <a:rPr lang="en-US" dirty="0"/>
+              <a:t>*</a:t>
+            </a:r>
+          </a:p>
+          <a:p>
+            <a:pPr marL="0" indent="0">
+              <a:buNone/>
+            </a:pPr>
+            <a:r>
+              <a:rPr lang="en-US" dirty="0"/>
+              <a:t>**</a:t>
+            </a:r>
+          </a:p>
+          <a:p>
+            <a:pPr marL="0" indent="0">
+              <a:buNone/>
+            </a:pPr>
+            <a:r>
+              <a:rPr lang="en-US" dirty="0"/>
+              <a:t>***</a:t>
+            </a:r>
+          </a:p>
+          <a:p>
+            <a:pPr marL="0" indent="0">
+              <a:buNone/>
+            </a:pPr>
+            <a:r>
+              <a:rPr lang="en-US" dirty="0"/>
+              <a:t>****</a:t>
+            </a:r>
+          </a:p>
+          <a:p>
+            <a:pPr marL="0" indent="0">
+              <a:buNone/>
+            </a:pPr>
+            <a:endParaRPr lang="en-US" dirty="0"/>
+          </a:p>
+          <a:p>
+            <a:pPr marL="0" indent="0">
+              <a:buNone/>
+            </a:pPr>
+            <a:r>
+              <a:rPr lang="en-US" dirty="0">
+                <a:solidFill>
+                  <a:srgbClr val="FF0000"/>
+                </a:solidFill>
+              </a:rPr>
+              <a:t>for (int x = 0; x &lt; size; x++)</a:t>
+            </a:r>
+          </a:p>
+          <a:p>
+            <a:pPr marL="0" indent="0">
+              <a:buNone/>
+            </a:pPr>
+            <a:r>
+              <a:rPr lang="en-US" dirty="0"/>
+              <a:t>    </a:t>
+            </a:r>
+            <a:r>
+              <a:rPr lang="en-US" dirty="0">
+                <a:solidFill>
+                  <a:srgbClr val="00B0F0"/>
+                </a:solidFill>
+              </a:rPr>
+              <a:t>for (int y = 0; y &lt; size; y++)</a:t>
+            </a:r>
+            <a:r>
+              <a:rPr lang="en-US" dirty="0"/>
+              <a:t>	{</a:t>
+            </a:r>
+          </a:p>
+          <a:p>
+            <a:pPr marL="0" indent="0">
+              <a:buNone/>
+            </a:pPr>
+            <a:r>
+              <a:rPr lang="en-US" dirty="0"/>
+              <a:t>            </a:t>
+            </a:r>
+            <a:r>
+              <a:rPr lang="en-US" dirty="0">
+                <a:solidFill>
+                  <a:srgbClr val="00B050"/>
+                </a:solidFill>
+              </a:rPr>
+              <a:t>//check </a:t>
+            </a:r>
+            <a:r>
+              <a:rPr lang="en-US" dirty="0">
+                <a:solidFill>
+                  <a:schemeClr val="accent6">
+                    <a:lumMod val="50000"/>
+                  </a:schemeClr>
+                </a:solidFill>
+              </a:rPr>
+              <a:t>when to draw *</a:t>
+            </a:r>
+          </a:p>
+          <a:p>
+            <a:pPr marL="0" indent="0">
+              <a:buNone/>
+            </a:pPr>
+            <a:r>
+              <a:rPr lang="en-US" dirty="0">
+                <a:solidFill>
+                  <a:schemeClr val="accent6">
+                    <a:lumMod val="50000"/>
+                  </a:schemeClr>
+                </a:solidFill>
+              </a:rPr>
+              <a:t>           //when to draw space</a:t>
+            </a:r>
+          </a:p>
+          <a:p>
+            <a:pPr marL="0" indent="0">
+              <a:buNone/>
+            </a:pPr>
+            <a:r>
+              <a:rPr lang="en-US" dirty="0">
+                <a:solidFill>
+                  <a:schemeClr val="accent6">
+                    <a:lumMod val="50000"/>
+                  </a:schemeClr>
+                </a:solidFill>
+              </a:rPr>
+              <a:t> </a:t>
+            </a:r>
+            <a:r>
+              <a:rPr lang="en-US" dirty="0"/>
+              <a:t>} </a:t>
+            </a:r>
+          </a:p>
+        </p:txBody>
+      </p:sp>
+      <p:sp>
+        <p:nvSpPr>
+          <p:cNvPr id="4" name="Content Placeholder 3">
+            <a:extLst>
+              <a:ext uri="{FF2B5EF4-FFF2-40B4-BE49-F238E27FC236}">
+                <a16:creationId xmlns:a16="http://schemas.microsoft.com/office/drawing/2014/main" id="{E2FB69D5-22A4-06C4-6AEE-18CD0200C8BB}"/>
+              </a:ext>
+            </a:extLst>
+          </p:cNvPr>
+          <p:cNvSpPr>
+            <a:spLocks noGrp="1"/>
+          </p:cNvSpPr>
+          <p:nvPr>
+            <p:ph sz="half" idx="2"/>
+          </p:nvPr>
+        </p:nvSpPr>
+        <p:spPr/>
+        <p:txBody>
+          <a:bodyPr>
+            <a:normAutofit fontScale="85000" lnSpcReduction="10000"/>
+          </a:bodyPr>
+          <a:lstStyle/>
+          <a:p>
+            <a:endParaRPr lang="en-US"/>
+          </a:p>
+        </p:txBody>
+      </p:sp>
+      <p:graphicFrame>
+        <p:nvGraphicFramePr>
+          <p:cNvPr id="5" name="Table 4"/>
+          <p:cNvGraphicFramePr>
+            <a:graphicFrameLocks noGrp="1"/>
+          </p:cNvGraphicFramePr>
+          <p:nvPr>
+            <p:extLst>
+              <p:ext uri="{D42A27DB-BD31-4B8C-83A1-F6EECF244321}">
+                <p14:modId xmlns:p14="http://schemas.microsoft.com/office/powerpoint/2010/main" val="1585436845"/>
+              </p:ext>
+            </p:extLst>
+          </p:nvPr>
+        </p:nvGraphicFramePr>
+        <p:xfrm>
+          <a:off x="4876800" y="2923381"/>
+          <a:ext cx="3581400" cy="1879600"/>
+        </p:xfrm>
+        <a:graphic>
+          <a:graphicData uri="http://schemas.openxmlformats.org/drawingml/2006/table">
+            <a:tbl>
+              <a:tblPr firstRow="1" bandRow="1">
+                <a:tableStyleId>{5C22544A-7EE6-4342-B048-85BDC9FD1C3A}</a:tableStyleId>
+              </a:tblPr>
+              <a:tblGrid>
+                <a:gridCol w="696686">
+                  <a:extLst>
+                    <a:ext uri="{9D8B030D-6E8A-4147-A177-3AD203B41FA5}">
+                      <a16:colId xmlns:a16="http://schemas.microsoft.com/office/drawing/2014/main" val="20000"/>
+                    </a:ext>
+                  </a:extLst>
+                </a:gridCol>
+                <a:gridCol w="674914">
+                  <a:extLst>
+                    <a:ext uri="{9D8B030D-6E8A-4147-A177-3AD203B41FA5}">
+                      <a16:colId xmlns:a16="http://schemas.microsoft.com/office/drawing/2014/main" val="20001"/>
+                    </a:ext>
+                  </a:extLst>
+                </a:gridCol>
+                <a:gridCol w="762000">
+                  <a:extLst>
+                    <a:ext uri="{9D8B030D-6E8A-4147-A177-3AD203B41FA5}">
+                      <a16:colId xmlns:a16="http://schemas.microsoft.com/office/drawing/2014/main" val="20002"/>
+                    </a:ext>
+                  </a:extLst>
+                </a:gridCol>
+                <a:gridCol w="685800">
+                  <a:extLst>
+                    <a:ext uri="{9D8B030D-6E8A-4147-A177-3AD203B41FA5}">
+                      <a16:colId xmlns:a16="http://schemas.microsoft.com/office/drawing/2014/main" val="20003"/>
+                    </a:ext>
+                  </a:extLst>
+                </a:gridCol>
+                <a:gridCol w="762000">
+                  <a:extLst>
+                    <a:ext uri="{9D8B030D-6E8A-4147-A177-3AD203B41FA5}">
+                      <a16:colId xmlns:a16="http://schemas.microsoft.com/office/drawing/2014/main" val="20004"/>
+                    </a:ext>
+                  </a:extLst>
+                </a:gridCol>
+              </a:tblGrid>
+              <a:tr h="396240">
+                <a:tc>
+                  <a:txBody>
+                    <a:bodyPr/>
+                    <a:lstStyle/>
+                    <a:p>
+                      <a:r>
+                        <a:rPr lang="en-US" b="1" dirty="0">
+                          <a:solidFill>
+                            <a:srgbClr val="FF0000"/>
+                          </a:solidFill>
+                        </a:rPr>
+                        <a:t>x</a:t>
+                      </a:r>
+                      <a:r>
+                        <a:rPr lang="en-US" b="1" dirty="0">
+                          <a:solidFill>
+                            <a:schemeClr val="tx1"/>
+                          </a:solidFill>
+                        </a:rPr>
+                        <a:t> \  </a:t>
+                      </a:r>
+                      <a:r>
+                        <a:rPr lang="en-US" b="1" dirty="0">
+                          <a:solidFill>
+                            <a:srgbClr val="00B0F0"/>
+                          </a:solidFill>
+                        </a:rPr>
+                        <a:t>y</a:t>
+                      </a:r>
+                    </a:p>
+                  </a:txBody>
+                  <a:tcPr>
+                    <a:solidFill>
+                      <a:schemeClr val="accent2">
+                        <a:lumMod val="20000"/>
+                        <a:lumOff val="80000"/>
+                      </a:schemeClr>
+                    </a:solidFill>
+                  </a:tcPr>
+                </a:tc>
+                <a:tc>
+                  <a:txBody>
+                    <a:bodyPr/>
+                    <a:lstStyle/>
+                    <a:p>
+                      <a:pPr algn="ctr"/>
+                      <a:r>
+                        <a:rPr lang="en-US" dirty="0">
+                          <a:solidFill>
+                            <a:srgbClr val="00B0F0"/>
+                          </a:solidFill>
+                        </a:rPr>
+                        <a:t>0</a:t>
+                      </a:r>
+                    </a:p>
+                  </a:txBody>
+                  <a:tcPr>
+                    <a:solidFill>
+                      <a:schemeClr val="accent2">
+                        <a:lumMod val="20000"/>
+                        <a:lumOff val="80000"/>
+                      </a:schemeClr>
+                    </a:solidFill>
+                  </a:tcPr>
+                </a:tc>
+                <a:tc>
+                  <a:txBody>
+                    <a:bodyPr/>
+                    <a:lstStyle/>
+                    <a:p>
+                      <a:pPr algn="ctr"/>
+                      <a:r>
+                        <a:rPr lang="en-US" dirty="0">
+                          <a:solidFill>
+                            <a:srgbClr val="00B0F0"/>
+                          </a:solidFill>
+                        </a:rPr>
+                        <a:t>1</a:t>
+                      </a:r>
+                    </a:p>
+                  </a:txBody>
+                  <a:tcPr>
+                    <a:solidFill>
+                      <a:schemeClr val="accent2">
+                        <a:lumMod val="20000"/>
+                        <a:lumOff val="80000"/>
+                      </a:schemeClr>
+                    </a:solidFill>
+                  </a:tcPr>
+                </a:tc>
+                <a:tc>
+                  <a:txBody>
+                    <a:bodyPr/>
+                    <a:lstStyle/>
+                    <a:p>
+                      <a:pPr algn="ctr"/>
+                      <a:r>
+                        <a:rPr lang="en-US" dirty="0">
+                          <a:solidFill>
+                            <a:srgbClr val="00B0F0"/>
+                          </a:solidFill>
+                        </a:rPr>
+                        <a:t>2</a:t>
+                      </a:r>
+                    </a:p>
+                  </a:txBody>
+                  <a:tcPr>
+                    <a:solidFill>
+                      <a:schemeClr val="accent2">
+                        <a:lumMod val="20000"/>
+                        <a:lumOff val="80000"/>
+                      </a:schemeClr>
+                    </a:solidFill>
+                  </a:tcPr>
+                </a:tc>
+                <a:tc>
+                  <a:txBody>
+                    <a:bodyPr/>
+                    <a:lstStyle/>
+                    <a:p>
+                      <a:pPr algn="ctr"/>
+                      <a:r>
+                        <a:rPr lang="en-US" dirty="0">
+                          <a:solidFill>
+                            <a:srgbClr val="00B0F0"/>
+                          </a:solidFill>
+                        </a:rPr>
+                        <a:t>3</a:t>
+                      </a:r>
+                    </a:p>
+                  </a:txBody>
+                  <a:tcPr>
+                    <a:solidFill>
+                      <a:schemeClr val="accent2">
+                        <a:lumMod val="20000"/>
+                        <a:lumOff val="80000"/>
+                      </a:schemeClr>
+                    </a:solidFill>
+                  </a:tcPr>
+                </a:tc>
+                <a:extLst>
+                  <a:ext uri="{0D108BD9-81ED-4DB2-BD59-A6C34878D82A}">
+                    <a16:rowId xmlns:a16="http://schemas.microsoft.com/office/drawing/2014/main" val="10000"/>
+                  </a:ext>
+                </a:extLst>
+              </a:tr>
+              <a:tr h="370840">
+                <a:tc>
+                  <a:txBody>
+                    <a:bodyPr/>
+                    <a:lstStyle/>
+                    <a:p>
+                      <a:pPr algn="ctr"/>
+                      <a:r>
+                        <a:rPr lang="en-US" b="1" dirty="0">
+                          <a:solidFill>
+                            <a:srgbClr val="FF0000"/>
+                          </a:solidFill>
+                        </a:rPr>
+                        <a:t>0</a:t>
+                      </a:r>
+                    </a:p>
+                  </a:txBody>
+                  <a:tcPr/>
+                </a:tc>
+                <a:tc>
+                  <a:txBody>
+                    <a:bodyPr/>
+                    <a:lstStyle/>
+                    <a:p>
+                      <a:pPr algn="ctr"/>
+                      <a:r>
+                        <a:rPr lang="en-US" sz="1500" dirty="0"/>
+                        <a:t>*</a:t>
+                      </a:r>
+                    </a:p>
+                  </a:txBody>
+                  <a:tcPr/>
+                </a:tc>
+                <a:tc>
+                  <a:txBody>
+                    <a:bodyPr/>
+                    <a:lstStyle/>
+                    <a:p>
+                      <a:pPr algn="ctr"/>
+                      <a:endParaRPr lang="en-US" sz="1500" dirty="0"/>
+                    </a:p>
+                  </a:txBody>
+                  <a:tcPr/>
+                </a:tc>
+                <a:tc>
+                  <a:txBody>
+                    <a:bodyPr/>
+                    <a:lstStyle/>
+                    <a:p>
+                      <a:pPr algn="ctr"/>
+                      <a:endParaRPr lang="en-US" sz="1500" dirty="0"/>
+                    </a:p>
+                  </a:txBody>
+                  <a:tcPr/>
+                </a:tc>
+                <a:tc>
+                  <a:txBody>
+                    <a:bodyPr/>
+                    <a:lstStyle/>
+                    <a:p>
+                      <a:pPr algn="ctr"/>
+                      <a:endParaRPr lang="en-US" sz="1500" dirty="0"/>
+                    </a:p>
+                  </a:txBody>
+                  <a:tcPr/>
+                </a:tc>
+                <a:extLst>
+                  <a:ext uri="{0D108BD9-81ED-4DB2-BD59-A6C34878D82A}">
+                    <a16:rowId xmlns:a16="http://schemas.microsoft.com/office/drawing/2014/main" val="10001"/>
+                  </a:ext>
+                </a:extLst>
+              </a:tr>
+              <a:tr h="370840">
+                <a:tc>
+                  <a:txBody>
+                    <a:bodyPr/>
+                    <a:lstStyle/>
+                    <a:p>
+                      <a:pPr algn="ctr"/>
+                      <a:r>
+                        <a:rPr lang="en-US" b="1" dirty="0">
+                          <a:solidFill>
+                            <a:srgbClr val="FF0000"/>
+                          </a:solidFill>
+                        </a:rPr>
+                        <a:t>1</a:t>
+                      </a:r>
+                    </a:p>
+                  </a:txBody>
+                  <a:tcPr/>
+                </a:tc>
+                <a:tc>
+                  <a:txBody>
+                    <a:bodyPr/>
+                    <a:lstStyle/>
+                    <a:p>
+                      <a:pPr algn="ctr"/>
+                      <a:r>
+                        <a:rPr lang="en-US" sz="1500" dirty="0"/>
+                        <a:t>*</a:t>
+                      </a:r>
+                    </a:p>
+                  </a:txBody>
+                  <a:tcPr/>
+                </a:tc>
+                <a:tc>
+                  <a:txBody>
+                    <a:bodyPr/>
+                    <a:lstStyle/>
+                    <a:p>
+                      <a:pPr algn="ctr"/>
+                      <a:r>
+                        <a:rPr lang="en-US" sz="1500" dirty="0"/>
+                        <a:t>*</a:t>
+                      </a:r>
+                    </a:p>
+                  </a:txBody>
+                  <a:tcPr/>
+                </a:tc>
+                <a:tc>
+                  <a:txBody>
+                    <a:bodyPr/>
+                    <a:lstStyle/>
+                    <a:p>
+                      <a:pPr algn="ctr"/>
+                      <a:endParaRPr lang="en-US" sz="1500" dirty="0"/>
+                    </a:p>
+                  </a:txBody>
+                  <a:tcPr/>
+                </a:tc>
+                <a:tc>
+                  <a:txBody>
+                    <a:bodyPr/>
+                    <a:lstStyle/>
+                    <a:p>
+                      <a:pPr algn="ctr"/>
+                      <a:endParaRPr lang="en-US" sz="1500" dirty="0"/>
+                    </a:p>
+                  </a:txBody>
+                  <a:tcPr/>
+                </a:tc>
+                <a:extLst>
+                  <a:ext uri="{0D108BD9-81ED-4DB2-BD59-A6C34878D82A}">
+                    <a16:rowId xmlns:a16="http://schemas.microsoft.com/office/drawing/2014/main" val="10002"/>
+                  </a:ext>
+                </a:extLst>
+              </a:tr>
+              <a:tr h="370840">
+                <a:tc>
+                  <a:txBody>
+                    <a:bodyPr/>
+                    <a:lstStyle/>
+                    <a:p>
+                      <a:pPr algn="ctr"/>
+                      <a:r>
+                        <a:rPr lang="en-US" b="1" dirty="0"/>
+                        <a:t>2</a:t>
+                      </a:r>
+                    </a:p>
+                  </a:txBody>
+                  <a:tcPr/>
+                </a:tc>
+                <a:tc>
+                  <a:txBody>
+                    <a:bodyPr/>
+                    <a:lstStyle/>
+                    <a:p>
+                      <a:pPr algn="ctr"/>
+                      <a:r>
+                        <a:rPr lang="en-US" sz="1500" dirty="0"/>
+                        <a:t>*</a:t>
+                      </a:r>
+                    </a:p>
+                  </a:txBody>
+                  <a:tcPr/>
+                </a:tc>
+                <a:tc>
+                  <a:txBody>
+                    <a:bodyPr/>
+                    <a:lstStyle/>
+                    <a:p>
+                      <a:pPr algn="ctr"/>
+                      <a:r>
+                        <a:rPr lang="en-US" sz="1500" dirty="0"/>
+                        <a:t>*</a:t>
+                      </a:r>
+                    </a:p>
+                  </a:txBody>
+                  <a:tcPr/>
+                </a:tc>
+                <a:tc>
+                  <a:txBody>
+                    <a:bodyPr/>
+                    <a:lstStyle/>
+                    <a:p>
+                      <a:pPr algn="ctr"/>
+                      <a:r>
+                        <a:rPr lang="en-US" sz="1500" dirty="0"/>
+                        <a:t>*</a:t>
+                      </a:r>
+                    </a:p>
+                  </a:txBody>
+                  <a:tcPr/>
+                </a:tc>
+                <a:tc>
+                  <a:txBody>
+                    <a:bodyPr/>
+                    <a:lstStyle/>
+                    <a:p>
+                      <a:pPr algn="ctr"/>
+                      <a:endParaRPr lang="en-US" sz="1500" dirty="0"/>
+                    </a:p>
+                  </a:txBody>
+                  <a:tcPr/>
+                </a:tc>
+                <a:extLst>
+                  <a:ext uri="{0D108BD9-81ED-4DB2-BD59-A6C34878D82A}">
+                    <a16:rowId xmlns:a16="http://schemas.microsoft.com/office/drawing/2014/main" val="10003"/>
+                  </a:ext>
+                </a:extLst>
+              </a:tr>
+              <a:tr h="370840">
+                <a:tc>
+                  <a:txBody>
+                    <a:bodyPr/>
+                    <a:lstStyle/>
+                    <a:p>
+                      <a:pPr algn="ctr"/>
+                      <a:r>
+                        <a:rPr lang="en-US" b="1" dirty="0">
+                          <a:solidFill>
+                            <a:srgbClr val="FF0000"/>
+                          </a:solidFill>
+                        </a:rPr>
+                        <a:t>3</a:t>
+                      </a:r>
+                    </a:p>
+                  </a:txBody>
+                  <a:tcPr/>
+                </a:tc>
+                <a:tc>
+                  <a:txBody>
+                    <a:bodyPr/>
+                    <a:lstStyle/>
+                    <a:p>
+                      <a:pPr algn="ctr"/>
+                      <a:r>
+                        <a:rPr lang="en-US" sz="1500" dirty="0"/>
+                        <a:t>*</a:t>
+                      </a:r>
+                    </a:p>
+                  </a:txBody>
+                  <a:tcPr/>
+                </a:tc>
+                <a:tc>
+                  <a:txBody>
+                    <a:bodyPr/>
+                    <a:lstStyle/>
+                    <a:p>
+                      <a:pPr algn="ctr"/>
+                      <a:r>
+                        <a:rPr lang="en-US" sz="1500" dirty="0"/>
+                        <a:t>*</a:t>
+                      </a:r>
+                    </a:p>
+                  </a:txBody>
+                  <a:tcPr/>
+                </a:tc>
+                <a:tc>
+                  <a:txBody>
+                    <a:bodyPr/>
+                    <a:lstStyle/>
+                    <a:p>
+                      <a:pPr algn="ctr"/>
+                      <a:r>
+                        <a:rPr lang="en-US" sz="1500" dirty="0"/>
+                        <a:t>*</a:t>
+                      </a:r>
+                    </a:p>
+                  </a:txBody>
+                  <a:tcPr/>
+                </a:tc>
+                <a:tc>
+                  <a:txBody>
+                    <a:bodyPr/>
+                    <a:lstStyle/>
+                    <a:p>
+                      <a:pPr algn="ctr"/>
+                      <a:r>
+                        <a:rPr lang="en-US" sz="1500" dirty="0"/>
+                        <a:t>*</a:t>
+                      </a:r>
+                    </a:p>
+                  </a:txBody>
+                  <a:tcPr/>
+                </a:tc>
+                <a:extLst>
+                  <a:ext uri="{0D108BD9-81ED-4DB2-BD59-A6C34878D82A}">
+                    <a16:rowId xmlns:a16="http://schemas.microsoft.com/office/drawing/2014/main" val="10004"/>
+                  </a:ext>
+                </a:extLst>
+              </a:tr>
+            </a:tbl>
+          </a:graphicData>
+        </a:graphic>
+      </p:graphicFrame>
+    </p:spTree>
+    <p:extLst>
+      <p:ext uri="{BB962C8B-B14F-4D97-AF65-F5344CB8AC3E}">
+        <p14:creationId xmlns:p14="http://schemas.microsoft.com/office/powerpoint/2010/main" val="1019606096"/>
+      </p:ext>
+    </p:extLst>
+  </p:cSld>
+  <p:clrMapOvr>
+    <a:masterClrMapping/>
+  </p:clrMapOvr>
+</p:sld>
+</file>
+
+<file path=ppt/slides/slide15.xml><?xml version="1.0" encoding="utf-8"?>
+<p:sld xmlns:a="http://schemas.openxmlformats.org/drawingml/2006/main" xmlns:r="http://schemas.openxmlformats.org/officeDocument/2006/relationships" xmlns:p="http://schemas.openxmlformats.org/presentationml/2006/main">
+  <p:cSld>
+    <p:spTree>
+      <p:nvGrpSpPr>
+        <p:cNvPr id="1" name=""/>
+        <p:cNvGrpSpPr/>
+        <p:nvPr/>
+      </p:nvGrpSpPr>
+      <p:grpSpPr>
+        <a:xfrm>
+          <a:off x="0" y="0"/>
+          <a:ext cx="0" cy="0"/>
+          <a:chOff x="0" y="0"/>
+          <a:chExt cx="0" cy="0"/>
+        </a:xfrm>
+      </p:grpSpPr>
+      <p:sp>
+        <p:nvSpPr>
+          <p:cNvPr id="2" name="Title 1"/>
+          <p:cNvSpPr>
+            <a:spLocks noGrp="1"/>
+          </p:cNvSpPr>
+          <p:nvPr>
+            <p:ph type="title"/>
+          </p:nvPr>
+        </p:nvSpPr>
+        <p:spPr/>
+        <p:txBody>
+          <a:bodyPr>
+            <a:normAutofit/>
+          </a:bodyPr>
+          <a:lstStyle/>
+          <a:p>
+            <a:r>
+              <a:rPr lang="en-US"/>
+              <a:t>Two diagonals</a:t>
+            </a:r>
+            <a:endParaRPr lang="en-US" dirty="0"/>
+          </a:p>
+        </p:txBody>
+      </p:sp>
+      <p:sp>
+        <p:nvSpPr>
+          <p:cNvPr id="3" name="Content Placeholder 2"/>
+          <p:cNvSpPr>
+            <a:spLocks noGrp="1"/>
+          </p:cNvSpPr>
+          <p:nvPr>
+            <p:ph sz="half" idx="1"/>
+          </p:nvPr>
+        </p:nvSpPr>
+        <p:spPr>
+          <a:xfrm>
+            <a:off x="457200" y="1600200"/>
+            <a:ext cx="4343400" cy="4525963"/>
+          </a:xfrm>
+        </p:spPr>
+        <p:txBody>
+          <a:bodyPr>
+            <a:normAutofit fontScale="85000" lnSpcReduction="10000"/>
+          </a:bodyPr>
+          <a:lstStyle/>
+          <a:p>
+            <a:pPr marL="0" indent="0">
+              <a:buNone/>
+            </a:pPr>
+            <a:r>
+              <a:rPr lang="en-US" dirty="0"/>
+              <a:t>Here is a lower triangle of size 4</a:t>
+            </a:r>
+          </a:p>
+          <a:p>
+            <a:pPr marL="0" indent="0">
+              <a:buNone/>
+            </a:pPr>
+            <a:r>
+              <a:rPr lang="en-US" dirty="0"/>
+              <a:t>*  *</a:t>
+            </a:r>
+          </a:p>
+          <a:p>
+            <a:pPr marL="0" indent="0">
+              <a:buNone/>
+            </a:pPr>
+            <a:r>
+              <a:rPr lang="en-US" dirty="0"/>
+              <a:t> **</a:t>
+            </a:r>
+          </a:p>
+          <a:p>
+            <a:pPr marL="0" indent="0">
+              <a:buNone/>
+            </a:pPr>
+            <a:r>
+              <a:rPr lang="en-US" dirty="0"/>
+              <a:t> **</a:t>
+            </a:r>
+          </a:p>
+          <a:p>
+            <a:pPr marL="0" indent="0">
+              <a:buNone/>
+            </a:pPr>
+            <a:r>
+              <a:rPr lang="en-US" dirty="0"/>
+              <a:t>*   *  </a:t>
+            </a:r>
+          </a:p>
+          <a:p>
+            <a:pPr marL="0" indent="0">
+              <a:buNone/>
+            </a:pPr>
+            <a:r>
+              <a:rPr lang="en-US" dirty="0">
+                <a:solidFill>
+                  <a:srgbClr val="FF0000"/>
+                </a:solidFill>
+              </a:rPr>
+              <a:t>for (int x = 0; x &lt; size; x++)</a:t>
+            </a:r>
+          </a:p>
+          <a:p>
+            <a:pPr marL="0" indent="0">
+              <a:buNone/>
+            </a:pPr>
+            <a:r>
+              <a:rPr lang="en-US" dirty="0"/>
+              <a:t>    </a:t>
+            </a:r>
+            <a:r>
+              <a:rPr lang="en-US" dirty="0">
+                <a:solidFill>
+                  <a:srgbClr val="00B0F0"/>
+                </a:solidFill>
+              </a:rPr>
+              <a:t>for (int y = 0; y &lt; size; y++)</a:t>
+            </a:r>
+            <a:r>
+              <a:rPr lang="en-US" dirty="0"/>
+              <a:t>	{</a:t>
+            </a:r>
+          </a:p>
+          <a:p>
+            <a:pPr marL="0" indent="0">
+              <a:buNone/>
+            </a:pPr>
+            <a:r>
+              <a:rPr lang="en-US" dirty="0"/>
+              <a:t>            </a:t>
+            </a:r>
+            <a:r>
+              <a:rPr lang="en-US" dirty="0">
+                <a:solidFill>
+                  <a:srgbClr val="00B050"/>
+                </a:solidFill>
+              </a:rPr>
+              <a:t>//check </a:t>
+            </a:r>
+            <a:r>
+              <a:rPr lang="en-US" dirty="0">
+                <a:solidFill>
+                  <a:schemeClr val="accent6">
+                    <a:lumMod val="50000"/>
+                  </a:schemeClr>
+                </a:solidFill>
+              </a:rPr>
+              <a:t>when to draw *</a:t>
+            </a:r>
+          </a:p>
+          <a:p>
+            <a:pPr marL="0" indent="0">
+              <a:buNone/>
+            </a:pPr>
+            <a:r>
+              <a:rPr lang="en-US" dirty="0">
+                <a:solidFill>
+                  <a:schemeClr val="accent6">
+                    <a:lumMod val="50000"/>
+                  </a:schemeClr>
+                </a:solidFill>
+              </a:rPr>
+              <a:t>           //when to draw space</a:t>
+            </a:r>
+          </a:p>
+          <a:p>
+            <a:pPr marL="0" indent="0">
+              <a:buNone/>
+            </a:pPr>
+            <a:r>
+              <a:rPr lang="en-US" dirty="0">
+                <a:solidFill>
+                  <a:schemeClr val="accent6">
+                    <a:lumMod val="50000"/>
+                  </a:schemeClr>
+                </a:solidFill>
+              </a:rPr>
+              <a:t> </a:t>
+            </a:r>
+            <a:r>
+              <a:rPr lang="en-US" dirty="0"/>
+              <a:t>} </a:t>
+            </a:r>
+          </a:p>
+        </p:txBody>
+      </p:sp>
+      <p:sp>
+        <p:nvSpPr>
+          <p:cNvPr id="4" name="Content Placeholder 3">
+            <a:extLst>
+              <a:ext uri="{FF2B5EF4-FFF2-40B4-BE49-F238E27FC236}">
+                <a16:creationId xmlns:a16="http://schemas.microsoft.com/office/drawing/2014/main" id="{E2FB69D5-22A4-06C4-6AEE-18CD0200C8BB}"/>
+              </a:ext>
+            </a:extLst>
+          </p:cNvPr>
+          <p:cNvSpPr>
+            <a:spLocks noGrp="1"/>
+          </p:cNvSpPr>
+          <p:nvPr>
+            <p:ph sz="half" idx="2"/>
+          </p:nvPr>
+        </p:nvSpPr>
+        <p:spPr/>
+        <p:txBody>
+          <a:bodyPr>
+            <a:normAutofit fontScale="85000" lnSpcReduction="10000"/>
+          </a:bodyPr>
+          <a:lstStyle/>
+          <a:p>
+            <a:endParaRPr lang="en-US"/>
+          </a:p>
+        </p:txBody>
+      </p:sp>
+      <p:graphicFrame>
+        <p:nvGraphicFramePr>
+          <p:cNvPr id="5" name="Table 4"/>
+          <p:cNvGraphicFramePr>
+            <a:graphicFrameLocks noGrp="1"/>
+          </p:cNvGraphicFramePr>
+          <p:nvPr>
+            <p:extLst>
+              <p:ext uri="{D42A27DB-BD31-4B8C-83A1-F6EECF244321}">
+                <p14:modId xmlns:p14="http://schemas.microsoft.com/office/powerpoint/2010/main" val="3289365973"/>
+              </p:ext>
+            </p:extLst>
+          </p:nvPr>
+        </p:nvGraphicFramePr>
+        <p:xfrm>
+          <a:off x="4953000" y="2923381"/>
+          <a:ext cx="3581400" cy="1879600"/>
+        </p:xfrm>
+        <a:graphic>
+          <a:graphicData uri="http://schemas.openxmlformats.org/drawingml/2006/table">
+            <a:tbl>
+              <a:tblPr firstRow="1" bandRow="1">
+                <a:tableStyleId>{5C22544A-7EE6-4342-B048-85BDC9FD1C3A}</a:tableStyleId>
+              </a:tblPr>
+              <a:tblGrid>
+                <a:gridCol w="696686">
+                  <a:extLst>
+                    <a:ext uri="{9D8B030D-6E8A-4147-A177-3AD203B41FA5}">
+                      <a16:colId xmlns:a16="http://schemas.microsoft.com/office/drawing/2014/main" val="20000"/>
+                    </a:ext>
+                  </a:extLst>
+                </a:gridCol>
+                <a:gridCol w="674914">
+                  <a:extLst>
+                    <a:ext uri="{9D8B030D-6E8A-4147-A177-3AD203B41FA5}">
+                      <a16:colId xmlns:a16="http://schemas.microsoft.com/office/drawing/2014/main" val="20001"/>
+                    </a:ext>
+                  </a:extLst>
+                </a:gridCol>
+                <a:gridCol w="762000">
+                  <a:extLst>
+                    <a:ext uri="{9D8B030D-6E8A-4147-A177-3AD203B41FA5}">
+                      <a16:colId xmlns:a16="http://schemas.microsoft.com/office/drawing/2014/main" val="20002"/>
+                    </a:ext>
+                  </a:extLst>
+                </a:gridCol>
+                <a:gridCol w="685800">
+                  <a:extLst>
+                    <a:ext uri="{9D8B030D-6E8A-4147-A177-3AD203B41FA5}">
+                      <a16:colId xmlns:a16="http://schemas.microsoft.com/office/drawing/2014/main" val="20003"/>
+                    </a:ext>
+                  </a:extLst>
+                </a:gridCol>
+                <a:gridCol w="762000">
+                  <a:extLst>
+                    <a:ext uri="{9D8B030D-6E8A-4147-A177-3AD203B41FA5}">
+                      <a16:colId xmlns:a16="http://schemas.microsoft.com/office/drawing/2014/main" val="20004"/>
+                    </a:ext>
+                  </a:extLst>
+                </a:gridCol>
+              </a:tblGrid>
+              <a:tr h="396240">
+                <a:tc>
+                  <a:txBody>
+                    <a:bodyPr/>
+                    <a:lstStyle/>
+                    <a:p>
+                      <a:r>
+                        <a:rPr lang="en-US" b="1" dirty="0">
+                          <a:solidFill>
+                            <a:srgbClr val="FF0000"/>
+                          </a:solidFill>
+                        </a:rPr>
+                        <a:t>x</a:t>
+                      </a:r>
+                      <a:r>
+                        <a:rPr lang="en-US" b="1" dirty="0">
+                          <a:solidFill>
+                            <a:schemeClr val="tx1"/>
+                          </a:solidFill>
+                        </a:rPr>
+                        <a:t> \  </a:t>
+                      </a:r>
+                      <a:r>
+                        <a:rPr lang="en-US" b="1" dirty="0">
+                          <a:solidFill>
+                            <a:srgbClr val="00B0F0"/>
+                          </a:solidFill>
+                        </a:rPr>
+                        <a:t>y</a:t>
+                      </a:r>
+                    </a:p>
+                  </a:txBody>
+                  <a:tcPr>
+                    <a:solidFill>
+                      <a:schemeClr val="accent2">
+                        <a:lumMod val="20000"/>
+                        <a:lumOff val="80000"/>
+                      </a:schemeClr>
+                    </a:solidFill>
+                  </a:tcPr>
+                </a:tc>
+                <a:tc>
+                  <a:txBody>
+                    <a:bodyPr/>
+                    <a:lstStyle/>
+                    <a:p>
+                      <a:pPr algn="ctr"/>
+                      <a:r>
+                        <a:rPr lang="en-US" dirty="0">
+                          <a:solidFill>
+                            <a:srgbClr val="00B0F0"/>
+                          </a:solidFill>
+                        </a:rPr>
+                        <a:t>0</a:t>
+                      </a:r>
+                    </a:p>
+                  </a:txBody>
+                  <a:tcPr>
+                    <a:solidFill>
+                      <a:schemeClr val="accent2">
+                        <a:lumMod val="20000"/>
+                        <a:lumOff val="80000"/>
+                      </a:schemeClr>
+                    </a:solidFill>
+                  </a:tcPr>
+                </a:tc>
+                <a:tc>
+                  <a:txBody>
+                    <a:bodyPr/>
+                    <a:lstStyle/>
+                    <a:p>
+                      <a:pPr algn="ctr"/>
+                      <a:r>
+                        <a:rPr lang="en-US" dirty="0">
+                          <a:solidFill>
+                            <a:srgbClr val="00B0F0"/>
+                          </a:solidFill>
+                        </a:rPr>
+                        <a:t>1</a:t>
+                      </a:r>
+                    </a:p>
+                  </a:txBody>
+                  <a:tcPr>
+                    <a:solidFill>
+                      <a:schemeClr val="accent2">
+                        <a:lumMod val="20000"/>
+                        <a:lumOff val="80000"/>
+                      </a:schemeClr>
+                    </a:solidFill>
+                  </a:tcPr>
+                </a:tc>
+                <a:tc>
+                  <a:txBody>
+                    <a:bodyPr/>
+                    <a:lstStyle/>
+                    <a:p>
+                      <a:pPr algn="ctr"/>
+                      <a:r>
+                        <a:rPr lang="en-US" dirty="0">
+                          <a:solidFill>
+                            <a:srgbClr val="00B0F0"/>
+                          </a:solidFill>
+                        </a:rPr>
+                        <a:t>2</a:t>
+                      </a:r>
+                    </a:p>
+                  </a:txBody>
+                  <a:tcPr>
+                    <a:solidFill>
+                      <a:schemeClr val="accent2">
+                        <a:lumMod val="20000"/>
+                        <a:lumOff val="80000"/>
+                      </a:schemeClr>
+                    </a:solidFill>
+                  </a:tcPr>
+                </a:tc>
+                <a:tc>
+                  <a:txBody>
+                    <a:bodyPr/>
+                    <a:lstStyle/>
+                    <a:p>
+                      <a:pPr algn="ctr"/>
+                      <a:r>
+                        <a:rPr lang="en-US" dirty="0">
+                          <a:solidFill>
+                            <a:srgbClr val="00B0F0"/>
+                          </a:solidFill>
+                        </a:rPr>
+                        <a:t>3</a:t>
+                      </a:r>
+                    </a:p>
+                  </a:txBody>
+                  <a:tcPr>
+                    <a:solidFill>
+                      <a:schemeClr val="accent2">
+                        <a:lumMod val="20000"/>
+                        <a:lumOff val="80000"/>
+                      </a:schemeClr>
+                    </a:solidFill>
+                  </a:tcPr>
+                </a:tc>
+                <a:extLst>
+                  <a:ext uri="{0D108BD9-81ED-4DB2-BD59-A6C34878D82A}">
+                    <a16:rowId xmlns:a16="http://schemas.microsoft.com/office/drawing/2014/main" val="10000"/>
+                  </a:ext>
+                </a:extLst>
+              </a:tr>
+              <a:tr h="370840">
+                <a:tc>
+                  <a:txBody>
+                    <a:bodyPr/>
+                    <a:lstStyle/>
+                    <a:p>
+                      <a:pPr algn="ctr"/>
+                      <a:r>
+                        <a:rPr lang="en-US" b="1" dirty="0">
+                          <a:solidFill>
+                            <a:srgbClr val="FF0000"/>
+                          </a:solidFill>
+                        </a:rPr>
+                        <a:t>0</a:t>
+                      </a:r>
+                    </a:p>
+                  </a:txBody>
+                  <a:tcPr/>
+                </a:tc>
+                <a:tc>
+                  <a:txBody>
+                    <a:bodyPr/>
+                    <a:lstStyle/>
+                    <a:p>
+                      <a:pPr algn="ctr"/>
+                      <a:r>
+                        <a:rPr lang="en-US" sz="1500" dirty="0"/>
+                        <a:t>*</a:t>
+                      </a:r>
+                    </a:p>
+                  </a:txBody>
+                  <a:tcPr/>
+                </a:tc>
+                <a:tc>
+                  <a:txBody>
+                    <a:bodyPr/>
+                    <a:lstStyle/>
+                    <a:p>
+                      <a:pPr algn="ctr"/>
+                      <a:endParaRPr lang="en-US" sz="1500" dirty="0"/>
+                    </a:p>
+                  </a:txBody>
+                  <a:tcPr/>
+                </a:tc>
+                <a:tc>
+                  <a:txBody>
+                    <a:bodyPr/>
+                    <a:lstStyle/>
+                    <a:p>
+                      <a:pPr algn="ctr"/>
+                      <a:endParaRPr lang="en-US" sz="1500" dirty="0"/>
+                    </a:p>
+                  </a:txBody>
+                  <a:tcPr/>
+                </a:tc>
+                <a:tc>
+                  <a:txBody>
+                    <a:bodyPr/>
+                    <a:lstStyle/>
+                    <a:p>
+                      <a:pPr algn="ctr"/>
+                      <a:r>
+                        <a:rPr lang="en-US" sz="1500" dirty="0"/>
+                        <a:t>*</a:t>
+                      </a:r>
+                    </a:p>
+                  </a:txBody>
+                  <a:tcPr/>
+                </a:tc>
+                <a:extLst>
+                  <a:ext uri="{0D108BD9-81ED-4DB2-BD59-A6C34878D82A}">
+                    <a16:rowId xmlns:a16="http://schemas.microsoft.com/office/drawing/2014/main" val="10001"/>
+                  </a:ext>
+                </a:extLst>
+              </a:tr>
+              <a:tr h="370840">
+                <a:tc>
+                  <a:txBody>
+                    <a:bodyPr/>
+                    <a:lstStyle/>
+                    <a:p>
+                      <a:pPr algn="ctr"/>
+                      <a:r>
+                        <a:rPr lang="en-US" b="1" dirty="0">
+                          <a:solidFill>
+                            <a:srgbClr val="FF0000"/>
+                          </a:solidFill>
+                        </a:rPr>
+                        <a:t>1</a:t>
+                      </a:r>
+                    </a:p>
+                  </a:txBody>
+                  <a:tcPr/>
+                </a:tc>
+                <a:tc>
+                  <a:txBody>
+                    <a:bodyPr/>
+                    <a:lstStyle/>
+                    <a:p>
+                      <a:pPr algn="ctr"/>
+                      <a:endParaRPr lang="en-US" sz="1500" dirty="0"/>
+                    </a:p>
+                  </a:txBody>
+                  <a:tcPr/>
+                </a:tc>
+                <a:tc>
+                  <a:txBody>
+                    <a:bodyPr/>
+                    <a:lstStyle/>
+                    <a:p>
+                      <a:pPr algn="ctr"/>
+                      <a:r>
+                        <a:rPr lang="en-US" sz="1500" dirty="0"/>
+                        <a:t>*</a:t>
+                      </a:r>
+                    </a:p>
+                  </a:txBody>
+                  <a:tcPr/>
+                </a:tc>
+                <a:tc>
+                  <a:txBody>
+                    <a:bodyPr/>
+                    <a:lstStyle/>
+                    <a:p>
+                      <a:pPr algn="ctr"/>
+                      <a:r>
+                        <a:rPr lang="en-US" sz="1500" dirty="0"/>
+                        <a:t>*</a:t>
+                      </a:r>
+                    </a:p>
+                  </a:txBody>
+                  <a:tcPr/>
+                </a:tc>
+                <a:tc>
+                  <a:txBody>
+                    <a:bodyPr/>
+                    <a:lstStyle/>
+                    <a:p>
+                      <a:pPr algn="ctr"/>
+                      <a:endParaRPr lang="en-US" sz="1500" dirty="0"/>
+                    </a:p>
+                  </a:txBody>
+                  <a:tcPr/>
+                </a:tc>
+                <a:extLst>
+                  <a:ext uri="{0D108BD9-81ED-4DB2-BD59-A6C34878D82A}">
+                    <a16:rowId xmlns:a16="http://schemas.microsoft.com/office/drawing/2014/main" val="10002"/>
+                  </a:ext>
+                </a:extLst>
+              </a:tr>
+              <a:tr h="370840">
+                <a:tc>
+                  <a:txBody>
+                    <a:bodyPr/>
+                    <a:lstStyle/>
+                    <a:p>
+                      <a:pPr algn="ctr"/>
+                      <a:r>
+                        <a:rPr lang="en-US" b="1" dirty="0"/>
+                        <a:t>2</a:t>
+                      </a:r>
+                    </a:p>
+                  </a:txBody>
+                  <a:tcPr/>
+                </a:tc>
+                <a:tc>
+                  <a:txBody>
+                    <a:bodyPr/>
+                    <a:lstStyle/>
+                    <a:p>
+                      <a:pPr algn="ctr"/>
+                      <a:endParaRPr lang="en-US" sz="1500" dirty="0"/>
+                    </a:p>
+                  </a:txBody>
+                  <a:tcPr/>
+                </a:tc>
+                <a:tc>
+                  <a:txBody>
+                    <a:bodyPr/>
+                    <a:lstStyle/>
+                    <a:p>
+                      <a:pPr algn="ctr"/>
+                      <a:r>
+                        <a:rPr lang="en-US" sz="1500" dirty="0"/>
+                        <a:t>*</a:t>
+                      </a:r>
+                    </a:p>
+                  </a:txBody>
+                  <a:tcPr/>
+                </a:tc>
+                <a:tc>
+                  <a:txBody>
+                    <a:bodyPr/>
+                    <a:lstStyle/>
+                    <a:p>
+                      <a:pPr algn="ctr"/>
+                      <a:r>
+                        <a:rPr lang="en-US" sz="1500" dirty="0"/>
+                        <a:t>*</a:t>
+                      </a:r>
+                    </a:p>
+                  </a:txBody>
+                  <a:tcPr/>
+                </a:tc>
+                <a:tc>
+                  <a:txBody>
+                    <a:bodyPr/>
+                    <a:lstStyle/>
+                    <a:p>
+                      <a:pPr algn="ctr"/>
+                      <a:endParaRPr lang="en-US" sz="1500" dirty="0"/>
+                    </a:p>
+                  </a:txBody>
+                  <a:tcPr/>
+                </a:tc>
+                <a:extLst>
+                  <a:ext uri="{0D108BD9-81ED-4DB2-BD59-A6C34878D82A}">
+                    <a16:rowId xmlns:a16="http://schemas.microsoft.com/office/drawing/2014/main" val="10003"/>
+                  </a:ext>
+                </a:extLst>
+              </a:tr>
+              <a:tr h="370840">
+                <a:tc>
+                  <a:txBody>
+                    <a:bodyPr/>
+                    <a:lstStyle/>
+                    <a:p>
+                      <a:pPr algn="ctr"/>
+                      <a:r>
+                        <a:rPr lang="en-US" b="1" dirty="0">
+                          <a:solidFill>
+                            <a:srgbClr val="FF0000"/>
+                          </a:solidFill>
+                        </a:rPr>
+                        <a:t>3</a:t>
+                      </a:r>
+                    </a:p>
+                  </a:txBody>
+                  <a:tcPr/>
+                </a:tc>
+                <a:tc>
+                  <a:txBody>
+                    <a:bodyPr/>
+                    <a:lstStyle/>
+                    <a:p>
+                      <a:pPr algn="ctr"/>
+                      <a:r>
+                        <a:rPr lang="en-US" sz="1500" dirty="0"/>
+                        <a:t>*</a:t>
+                      </a:r>
+                    </a:p>
+                  </a:txBody>
+                  <a:tcPr/>
+                </a:tc>
+                <a:tc>
+                  <a:txBody>
+                    <a:bodyPr/>
+                    <a:lstStyle/>
+                    <a:p>
+                      <a:pPr algn="ctr"/>
+                      <a:endParaRPr lang="en-US" sz="1500" dirty="0"/>
+                    </a:p>
+                  </a:txBody>
+                  <a:tcPr/>
+                </a:tc>
+                <a:tc>
+                  <a:txBody>
+                    <a:bodyPr/>
+                    <a:lstStyle/>
+                    <a:p>
+                      <a:pPr algn="ctr"/>
+                      <a:endParaRPr lang="en-US" sz="1500" dirty="0"/>
+                    </a:p>
+                  </a:txBody>
+                  <a:tcPr/>
+                </a:tc>
+                <a:tc>
+                  <a:txBody>
+                    <a:bodyPr/>
+                    <a:lstStyle/>
+                    <a:p>
+                      <a:pPr algn="ctr"/>
+                      <a:r>
+                        <a:rPr lang="en-US" sz="1500" dirty="0"/>
+                        <a:t>*</a:t>
+                      </a:r>
+                    </a:p>
+                  </a:txBody>
+                  <a:tcPr/>
+                </a:tc>
+                <a:extLst>
+                  <a:ext uri="{0D108BD9-81ED-4DB2-BD59-A6C34878D82A}">
+                    <a16:rowId xmlns:a16="http://schemas.microsoft.com/office/drawing/2014/main" val="10004"/>
+                  </a:ext>
+                </a:extLst>
+              </a:tr>
+            </a:tbl>
+          </a:graphicData>
+        </a:graphic>
+      </p:graphicFrame>
+    </p:spTree>
+    <p:extLst>
+      <p:ext uri="{BB962C8B-B14F-4D97-AF65-F5344CB8AC3E}">
+        <p14:creationId xmlns:p14="http://schemas.microsoft.com/office/powerpoint/2010/main" val="314439120"/>
+      </p:ext>
+    </p:extLst>
+  </p:cSld>
+  <p:clrMapOvr>
+    <a:masterClrMapping/>
+  </p:clrMapOvr>
+</p:sld>
+</file>
+
+<file path=ppt/slides/slide16.xml><?xml version="1.0" encoding="utf-8"?>
+<p:sld xmlns:a="http://schemas.openxmlformats.org/drawingml/2006/main" xmlns:r="http://schemas.openxmlformats.org/officeDocument/2006/relationships" xmlns:p="http://schemas.openxmlformats.org/presentationml/2006/main">
+  <p:cSld>
+    <p:spTree>
+      <p:nvGrpSpPr>
+        <p:cNvPr id="1" name=""/>
+        <p:cNvGrpSpPr/>
+        <p:nvPr/>
+      </p:nvGrpSpPr>
+      <p:grpSpPr>
+        <a:xfrm>
+          <a:off x="0" y="0"/>
+          <a:ext cx="0" cy="0"/>
+          <a:chOff x="0" y="0"/>
+          <a:chExt cx="0" cy="0"/>
+        </a:xfrm>
+      </p:grpSpPr>
+      <p:sp>
+        <p:nvSpPr>
+          <p:cNvPr id="2" name="Title 1"/>
+          <p:cNvSpPr>
+            <a:spLocks noGrp="1"/>
+          </p:cNvSpPr>
+          <p:nvPr>
+            <p:ph type="title"/>
+          </p:nvPr>
+        </p:nvSpPr>
+        <p:spPr/>
+        <p:txBody>
+          <a:bodyPr>
+            <a:normAutofit/>
+          </a:bodyPr>
+          <a:lstStyle/>
+          <a:p>
+            <a:r>
+              <a:rPr lang="en-US"/>
+              <a:t>Two diagonals</a:t>
+            </a:r>
+            <a:endParaRPr lang="en-US" dirty="0"/>
+          </a:p>
+        </p:txBody>
+      </p:sp>
+      <p:sp>
+        <p:nvSpPr>
+          <p:cNvPr id="3" name="Content Placeholder 2"/>
+          <p:cNvSpPr>
+            <a:spLocks noGrp="1"/>
+          </p:cNvSpPr>
+          <p:nvPr>
+            <p:ph sz="half" idx="1"/>
+          </p:nvPr>
+        </p:nvSpPr>
+        <p:spPr>
+          <a:xfrm>
+            <a:off x="457200" y="1600200"/>
+            <a:ext cx="4343400" cy="4525963"/>
+          </a:xfrm>
+        </p:spPr>
+        <p:txBody>
+          <a:bodyPr>
+            <a:normAutofit fontScale="85000" lnSpcReduction="10000"/>
+          </a:bodyPr>
+          <a:lstStyle/>
+          <a:p>
+            <a:pPr marL="0" indent="0">
+              <a:buNone/>
+            </a:pPr>
+            <a:r>
+              <a:rPr lang="en-US" dirty="0"/>
+              <a:t>Here is a lower triangle of size 4</a:t>
+            </a:r>
+          </a:p>
+          <a:p>
+            <a:pPr marL="0" indent="0">
+              <a:buNone/>
+            </a:pPr>
+            <a:r>
+              <a:rPr lang="en-US" dirty="0"/>
+              <a:t>*  *</a:t>
+            </a:r>
+          </a:p>
+          <a:p>
+            <a:pPr marL="0" indent="0">
+              <a:buNone/>
+            </a:pPr>
+            <a:r>
+              <a:rPr lang="en-US" dirty="0"/>
+              <a:t> **</a:t>
+            </a:r>
+          </a:p>
+          <a:p>
+            <a:pPr marL="0" indent="0">
+              <a:buNone/>
+            </a:pPr>
+            <a:r>
+              <a:rPr lang="en-US" dirty="0"/>
+              <a:t> **</a:t>
+            </a:r>
+          </a:p>
+          <a:p>
+            <a:pPr marL="0" indent="0">
+              <a:buNone/>
+            </a:pPr>
+            <a:r>
+              <a:rPr lang="en-US" dirty="0"/>
+              <a:t>*   *  </a:t>
+            </a:r>
+          </a:p>
+          <a:p>
+            <a:pPr marL="0" indent="0">
+              <a:buNone/>
+            </a:pPr>
+            <a:r>
+              <a:rPr lang="en-US" dirty="0">
+                <a:solidFill>
+                  <a:srgbClr val="FF0000"/>
+                </a:solidFill>
+              </a:rPr>
+              <a:t>for (int x = 0; x &lt; size; x++)</a:t>
+            </a:r>
+          </a:p>
+          <a:p>
+            <a:pPr marL="0" indent="0">
+              <a:buNone/>
+            </a:pPr>
+            <a:r>
+              <a:rPr lang="en-US" dirty="0"/>
+              <a:t>    </a:t>
+            </a:r>
+            <a:r>
+              <a:rPr lang="en-US" dirty="0">
+                <a:solidFill>
+                  <a:srgbClr val="00B0F0"/>
+                </a:solidFill>
+              </a:rPr>
+              <a:t>for (int y = 0; y &lt; size; y++)</a:t>
+            </a:r>
+            <a:r>
+              <a:rPr lang="en-US" dirty="0"/>
+              <a:t>	{</a:t>
+            </a:r>
+          </a:p>
+          <a:p>
+            <a:pPr marL="0" indent="0">
+              <a:buNone/>
+            </a:pPr>
+            <a:r>
+              <a:rPr lang="en-US" dirty="0"/>
+              <a:t>            </a:t>
+            </a:r>
+            <a:r>
+              <a:rPr lang="en-US" dirty="0">
+                <a:solidFill>
+                  <a:srgbClr val="00B050"/>
+                </a:solidFill>
+              </a:rPr>
+              <a:t>//check </a:t>
+            </a:r>
+            <a:r>
+              <a:rPr lang="en-US" dirty="0">
+                <a:solidFill>
+                  <a:schemeClr val="accent6">
+                    <a:lumMod val="50000"/>
+                  </a:schemeClr>
+                </a:solidFill>
+              </a:rPr>
+              <a:t>when to draw *</a:t>
+            </a:r>
+          </a:p>
+          <a:p>
+            <a:pPr marL="0" indent="0">
+              <a:buNone/>
+            </a:pPr>
+            <a:r>
+              <a:rPr lang="en-US" dirty="0">
+                <a:solidFill>
+                  <a:schemeClr val="accent6">
+                    <a:lumMod val="50000"/>
+                  </a:schemeClr>
+                </a:solidFill>
+              </a:rPr>
+              <a:t>           //when to draw space</a:t>
+            </a:r>
+          </a:p>
+          <a:p>
+            <a:pPr marL="0" indent="0">
+              <a:buNone/>
+            </a:pPr>
+            <a:r>
+              <a:rPr lang="en-US" dirty="0">
+                <a:solidFill>
+                  <a:schemeClr val="accent6">
+                    <a:lumMod val="50000"/>
+                  </a:schemeClr>
+                </a:solidFill>
+              </a:rPr>
+              <a:t> </a:t>
+            </a:r>
+            <a:r>
+              <a:rPr lang="en-US" dirty="0"/>
+              <a:t>} </a:t>
+            </a:r>
+          </a:p>
+        </p:txBody>
+      </p:sp>
+      <p:sp>
+        <p:nvSpPr>
+          <p:cNvPr id="4" name="Content Placeholder 3">
+            <a:extLst>
+              <a:ext uri="{FF2B5EF4-FFF2-40B4-BE49-F238E27FC236}">
+                <a16:creationId xmlns:a16="http://schemas.microsoft.com/office/drawing/2014/main" id="{E2FB69D5-22A4-06C4-6AEE-18CD0200C8BB}"/>
+              </a:ext>
+            </a:extLst>
+          </p:cNvPr>
+          <p:cNvSpPr>
+            <a:spLocks noGrp="1"/>
+          </p:cNvSpPr>
+          <p:nvPr>
+            <p:ph sz="half" idx="2"/>
+          </p:nvPr>
+        </p:nvSpPr>
+        <p:spPr/>
+        <p:txBody>
+          <a:bodyPr>
+            <a:normAutofit fontScale="85000" lnSpcReduction="10000"/>
+          </a:bodyPr>
+          <a:lstStyle/>
+          <a:p>
+            <a:endParaRPr lang="en-US" dirty="0"/>
+          </a:p>
+        </p:txBody>
+      </p:sp>
+      <p:graphicFrame>
+        <p:nvGraphicFramePr>
+          <p:cNvPr id="5" name="Table 4"/>
+          <p:cNvGraphicFramePr>
+            <a:graphicFrameLocks noGrp="1"/>
+          </p:cNvGraphicFramePr>
+          <p:nvPr>
+            <p:extLst>
+              <p:ext uri="{D42A27DB-BD31-4B8C-83A1-F6EECF244321}">
+                <p14:modId xmlns:p14="http://schemas.microsoft.com/office/powerpoint/2010/main" val="3197006279"/>
+              </p:ext>
+            </p:extLst>
+          </p:nvPr>
+        </p:nvGraphicFramePr>
+        <p:xfrm>
+          <a:off x="4648200" y="2923381"/>
+          <a:ext cx="3886199" cy="1879600"/>
+        </p:xfrm>
+        <a:graphic>
+          <a:graphicData uri="http://schemas.openxmlformats.org/drawingml/2006/table">
+            <a:tbl>
+              <a:tblPr firstRow="1" bandRow="1">
+                <a:tableStyleId>{5C22544A-7EE6-4342-B048-85BDC9FD1C3A}</a:tableStyleId>
+              </a:tblPr>
+              <a:tblGrid>
+                <a:gridCol w="1143000">
+                  <a:extLst>
+                    <a:ext uri="{9D8B030D-6E8A-4147-A177-3AD203B41FA5}">
+                      <a16:colId xmlns:a16="http://schemas.microsoft.com/office/drawing/2014/main" val="20000"/>
+                    </a:ext>
+                  </a:extLst>
+                </a:gridCol>
+                <a:gridCol w="609600">
+                  <a:extLst>
+                    <a:ext uri="{9D8B030D-6E8A-4147-A177-3AD203B41FA5}">
+                      <a16:colId xmlns:a16="http://schemas.microsoft.com/office/drawing/2014/main" val="20001"/>
+                    </a:ext>
+                  </a:extLst>
+                </a:gridCol>
+                <a:gridCol w="609600">
+                  <a:extLst>
+                    <a:ext uri="{9D8B030D-6E8A-4147-A177-3AD203B41FA5}">
+                      <a16:colId xmlns:a16="http://schemas.microsoft.com/office/drawing/2014/main" val="20002"/>
+                    </a:ext>
+                  </a:extLst>
+                </a:gridCol>
+                <a:gridCol w="457200">
+                  <a:extLst>
+                    <a:ext uri="{9D8B030D-6E8A-4147-A177-3AD203B41FA5}">
+                      <a16:colId xmlns:a16="http://schemas.microsoft.com/office/drawing/2014/main" val="20003"/>
+                    </a:ext>
+                  </a:extLst>
+                </a:gridCol>
+                <a:gridCol w="1066799">
+                  <a:extLst>
+                    <a:ext uri="{9D8B030D-6E8A-4147-A177-3AD203B41FA5}">
+                      <a16:colId xmlns:a16="http://schemas.microsoft.com/office/drawing/2014/main" val="20004"/>
+                    </a:ext>
+                  </a:extLst>
+                </a:gridCol>
+              </a:tblGrid>
+              <a:tr h="396240">
+                <a:tc>
+                  <a:txBody>
+                    <a:bodyPr/>
+                    <a:lstStyle/>
+                    <a:p>
+                      <a:r>
+                        <a:rPr lang="en-US" b="1" dirty="0">
+                          <a:solidFill>
+                            <a:srgbClr val="FF0000"/>
+                          </a:solidFill>
+                        </a:rPr>
+                        <a:t>row</a:t>
+                      </a:r>
+                      <a:r>
+                        <a:rPr lang="en-US" b="1" dirty="0">
+                          <a:solidFill>
+                            <a:schemeClr val="tx1"/>
+                          </a:solidFill>
+                        </a:rPr>
+                        <a:t>\  </a:t>
+                      </a:r>
+                      <a:r>
+                        <a:rPr lang="en-US" b="1" dirty="0">
+                          <a:solidFill>
+                            <a:srgbClr val="00B0F0"/>
+                          </a:solidFill>
+                        </a:rPr>
+                        <a:t>col</a:t>
+                      </a:r>
+                    </a:p>
+                  </a:txBody>
+                  <a:tcPr>
+                    <a:solidFill>
+                      <a:schemeClr val="accent2">
+                        <a:lumMod val="20000"/>
+                        <a:lumOff val="80000"/>
+                      </a:schemeClr>
+                    </a:solidFill>
+                  </a:tcPr>
+                </a:tc>
+                <a:tc>
+                  <a:txBody>
+                    <a:bodyPr/>
+                    <a:lstStyle/>
+                    <a:p>
+                      <a:pPr algn="ctr"/>
+                      <a:r>
+                        <a:rPr lang="en-US" dirty="0">
+                          <a:solidFill>
+                            <a:srgbClr val="00B0F0"/>
+                          </a:solidFill>
+                        </a:rPr>
+                        <a:t>0</a:t>
+                      </a:r>
+                    </a:p>
+                  </a:txBody>
+                  <a:tcPr>
+                    <a:solidFill>
+                      <a:schemeClr val="accent2">
+                        <a:lumMod val="20000"/>
+                        <a:lumOff val="80000"/>
+                      </a:schemeClr>
+                    </a:solidFill>
+                  </a:tcPr>
+                </a:tc>
+                <a:tc>
+                  <a:txBody>
+                    <a:bodyPr/>
+                    <a:lstStyle/>
+                    <a:p>
+                      <a:pPr algn="ctr"/>
+                      <a:r>
+                        <a:rPr lang="en-US" dirty="0">
+                          <a:solidFill>
+                            <a:srgbClr val="00B0F0"/>
+                          </a:solidFill>
+                        </a:rPr>
+                        <a:t>1</a:t>
+                      </a:r>
+                    </a:p>
+                  </a:txBody>
+                  <a:tcPr>
+                    <a:solidFill>
+                      <a:schemeClr val="accent2">
+                        <a:lumMod val="20000"/>
+                        <a:lumOff val="80000"/>
+                      </a:schemeClr>
+                    </a:solidFill>
+                  </a:tcPr>
+                </a:tc>
+                <a:tc>
+                  <a:txBody>
+                    <a:bodyPr/>
+                    <a:lstStyle/>
+                    <a:p>
+                      <a:pPr algn="ctr"/>
+                      <a:r>
+                        <a:rPr lang="en-US" dirty="0">
+                          <a:solidFill>
+                            <a:srgbClr val="00B0F0"/>
+                          </a:solidFill>
+                        </a:rPr>
+                        <a:t>2</a:t>
+                      </a:r>
+                    </a:p>
+                  </a:txBody>
+                  <a:tcPr>
+                    <a:solidFill>
+                      <a:schemeClr val="accent2">
+                        <a:lumMod val="20000"/>
+                        <a:lumOff val="80000"/>
+                      </a:schemeClr>
+                    </a:solidFill>
+                  </a:tcPr>
+                </a:tc>
+                <a:tc>
+                  <a:txBody>
+                    <a:bodyPr/>
+                    <a:lstStyle/>
+                    <a:p>
+                      <a:pPr algn="ctr"/>
+                      <a:r>
+                        <a:rPr lang="en-US" dirty="0">
+                          <a:solidFill>
+                            <a:srgbClr val="00B0F0"/>
+                          </a:solidFill>
+                        </a:rPr>
+                        <a:t>3</a:t>
+                      </a:r>
+                    </a:p>
+                  </a:txBody>
+                  <a:tcPr>
+                    <a:solidFill>
+                      <a:schemeClr val="accent2">
+                        <a:lumMod val="20000"/>
+                        <a:lumOff val="80000"/>
+                      </a:schemeClr>
+                    </a:solidFill>
+                  </a:tcPr>
+                </a:tc>
+                <a:extLst>
+                  <a:ext uri="{0D108BD9-81ED-4DB2-BD59-A6C34878D82A}">
+                    <a16:rowId xmlns:a16="http://schemas.microsoft.com/office/drawing/2014/main" val="10000"/>
+                  </a:ext>
+                </a:extLst>
+              </a:tr>
+              <a:tr h="370840">
+                <a:tc>
+                  <a:txBody>
+                    <a:bodyPr/>
+                    <a:lstStyle/>
+                    <a:p>
+                      <a:pPr algn="ctr"/>
+                      <a:r>
+                        <a:rPr lang="en-US" b="1" dirty="0">
+                          <a:solidFill>
+                            <a:srgbClr val="FF0000"/>
+                          </a:solidFill>
+                        </a:rPr>
+                        <a:t>0</a:t>
+                      </a:r>
+                    </a:p>
+                  </a:txBody>
+                  <a:tcPr/>
+                </a:tc>
+                <a:tc>
+                  <a:txBody>
+                    <a:bodyPr/>
+                    <a:lstStyle/>
+                    <a:p>
+                      <a:pPr algn="ctr"/>
+                      <a:endParaRPr lang="en-US" sz="1500" dirty="0"/>
+                    </a:p>
+                  </a:txBody>
+                  <a:tcPr/>
+                </a:tc>
+                <a:tc>
+                  <a:txBody>
+                    <a:bodyPr/>
+                    <a:lstStyle/>
+                    <a:p>
+                      <a:pPr algn="ctr"/>
+                      <a:endParaRPr lang="en-US" sz="1500" dirty="0"/>
+                    </a:p>
+                  </a:txBody>
+                  <a:tcPr/>
+                </a:tc>
+                <a:tc>
+                  <a:txBody>
+                    <a:bodyPr/>
+                    <a:lstStyle/>
+                    <a:p>
+                      <a:pPr algn="ctr"/>
+                      <a:r>
+                        <a:rPr lang="en-US" sz="1500" dirty="0"/>
+                        <a:t>*</a:t>
+                      </a:r>
+                    </a:p>
+                  </a:txBody>
+                  <a:tcPr/>
+                </a:tc>
+                <a:tc>
+                  <a:txBody>
+                    <a:bodyPr/>
+                    <a:lstStyle/>
+                    <a:p>
+                      <a:pPr algn="ctr"/>
+                      <a:r>
+                        <a:rPr lang="en-US" sz="1500" dirty="0"/>
+                        <a:t>*</a:t>
+                      </a:r>
+                    </a:p>
+                  </a:txBody>
+                  <a:tcPr/>
+                </a:tc>
+                <a:extLst>
+                  <a:ext uri="{0D108BD9-81ED-4DB2-BD59-A6C34878D82A}">
+                    <a16:rowId xmlns:a16="http://schemas.microsoft.com/office/drawing/2014/main" val="10001"/>
+                  </a:ext>
+                </a:extLst>
+              </a:tr>
+              <a:tr h="370840">
+                <a:tc>
+                  <a:txBody>
+                    <a:bodyPr/>
+                    <a:lstStyle/>
+                    <a:p>
+                      <a:pPr algn="ctr"/>
+                      <a:r>
+                        <a:rPr lang="en-US" b="1" dirty="0">
+                          <a:solidFill>
+                            <a:srgbClr val="FF0000"/>
+                          </a:solidFill>
+                        </a:rPr>
+                        <a:t>1</a:t>
+                      </a:r>
+                    </a:p>
+                  </a:txBody>
+                  <a:tcPr/>
+                </a:tc>
+                <a:tc>
+                  <a:txBody>
+                    <a:bodyPr/>
+                    <a:lstStyle/>
+                    <a:p>
+                      <a:pPr algn="ctr"/>
+                      <a:endParaRPr lang="en-US" sz="1500" dirty="0"/>
+                    </a:p>
+                  </a:txBody>
+                  <a:tcPr/>
+                </a:tc>
+                <a:tc>
+                  <a:txBody>
+                    <a:bodyPr/>
+                    <a:lstStyle/>
+                    <a:p>
+                      <a:pPr algn="ctr"/>
+                      <a:r>
+                        <a:rPr lang="en-US" sz="1500" dirty="0"/>
+                        <a:t>*</a:t>
+                      </a:r>
+                    </a:p>
+                  </a:txBody>
+                  <a:tcPr/>
+                </a:tc>
+                <a:tc>
+                  <a:txBody>
+                    <a:bodyPr/>
+                    <a:lstStyle/>
+                    <a:p>
+                      <a:pPr algn="ctr"/>
+                      <a:endParaRPr lang="en-US" sz="1500" dirty="0"/>
+                    </a:p>
+                  </a:txBody>
+                  <a:tcPr/>
+                </a:tc>
+                <a:tc>
+                  <a:txBody>
+                    <a:bodyPr/>
+                    <a:lstStyle/>
+                    <a:p>
+                      <a:pPr algn="ctr"/>
+                      <a:endParaRPr lang="en-US" sz="1500" dirty="0"/>
+                    </a:p>
+                  </a:txBody>
+                  <a:tcPr/>
+                </a:tc>
+                <a:extLst>
+                  <a:ext uri="{0D108BD9-81ED-4DB2-BD59-A6C34878D82A}">
+                    <a16:rowId xmlns:a16="http://schemas.microsoft.com/office/drawing/2014/main" val="10002"/>
+                  </a:ext>
+                </a:extLst>
+              </a:tr>
+              <a:tr h="370840">
+                <a:tc>
+                  <a:txBody>
+                    <a:bodyPr/>
+                    <a:lstStyle/>
+                    <a:p>
+                      <a:pPr algn="ctr"/>
+                      <a:r>
+                        <a:rPr lang="en-US" b="1" dirty="0">
+                          <a:solidFill>
+                            <a:srgbClr val="FF0000"/>
+                          </a:solidFill>
+                        </a:rPr>
+                        <a:t>2</a:t>
+                      </a:r>
+                    </a:p>
+                  </a:txBody>
+                  <a:tcPr/>
+                </a:tc>
+                <a:tc>
+                  <a:txBody>
+                    <a:bodyPr/>
+                    <a:lstStyle/>
+                    <a:p>
+                      <a:pPr algn="ctr"/>
+                      <a:r>
+                        <a:rPr lang="en-US" sz="1500" dirty="0"/>
+                        <a:t>*</a:t>
+                      </a:r>
+                    </a:p>
+                  </a:txBody>
+                  <a:tcPr/>
+                </a:tc>
+                <a:tc>
+                  <a:txBody>
+                    <a:bodyPr/>
+                    <a:lstStyle/>
+                    <a:p>
+                      <a:pPr algn="ctr"/>
+                      <a:endParaRPr lang="en-US" sz="1500" dirty="0"/>
+                    </a:p>
+                  </a:txBody>
+                  <a:tcPr/>
+                </a:tc>
+                <a:tc>
+                  <a:txBody>
+                    <a:bodyPr/>
+                    <a:lstStyle/>
+                    <a:p>
+                      <a:pPr algn="ctr"/>
+                      <a:endParaRPr lang="en-US" sz="1500" dirty="0"/>
+                    </a:p>
+                  </a:txBody>
+                  <a:tcPr/>
+                </a:tc>
+                <a:tc>
+                  <a:txBody>
+                    <a:bodyPr/>
+                    <a:lstStyle/>
+                    <a:p>
+                      <a:pPr algn="ctr"/>
+                      <a:endParaRPr lang="en-US" sz="1500" dirty="0"/>
+                    </a:p>
+                  </a:txBody>
+                  <a:tcPr/>
+                </a:tc>
+                <a:extLst>
+                  <a:ext uri="{0D108BD9-81ED-4DB2-BD59-A6C34878D82A}">
+                    <a16:rowId xmlns:a16="http://schemas.microsoft.com/office/drawing/2014/main" val="10003"/>
+                  </a:ext>
+                </a:extLst>
+              </a:tr>
+              <a:tr h="370840">
+                <a:tc>
+                  <a:txBody>
+                    <a:bodyPr/>
+                    <a:lstStyle/>
+                    <a:p>
+                      <a:pPr algn="ctr"/>
+                      <a:r>
+                        <a:rPr lang="en-US" b="1" dirty="0">
+                          <a:solidFill>
+                            <a:srgbClr val="FF0000"/>
+                          </a:solidFill>
+                        </a:rPr>
+                        <a:t>3</a:t>
+                      </a:r>
+                    </a:p>
+                  </a:txBody>
+                  <a:tcPr/>
+                </a:tc>
+                <a:tc>
+                  <a:txBody>
+                    <a:bodyPr/>
+                    <a:lstStyle/>
+                    <a:p>
+                      <a:pPr algn="ctr"/>
+                      <a:r>
+                        <a:rPr lang="en-US" sz="1500" dirty="0"/>
+                        <a:t>*</a:t>
+                      </a:r>
+                    </a:p>
+                  </a:txBody>
+                  <a:tcPr/>
+                </a:tc>
+                <a:tc>
+                  <a:txBody>
+                    <a:bodyPr/>
+                    <a:lstStyle/>
+                    <a:p>
+                      <a:pPr algn="ctr"/>
+                      <a:endParaRPr lang="en-US" sz="1500" dirty="0"/>
+                    </a:p>
+                  </a:txBody>
+                  <a:tcPr/>
+                </a:tc>
+                <a:tc>
+                  <a:txBody>
+                    <a:bodyPr/>
+                    <a:lstStyle/>
+                    <a:p>
+                      <a:pPr algn="ctr"/>
+                      <a:endParaRPr lang="en-US" sz="1500" dirty="0"/>
+                    </a:p>
+                  </a:txBody>
+                  <a:tcPr/>
+                </a:tc>
+                <a:tc>
+                  <a:txBody>
+                    <a:bodyPr/>
+                    <a:lstStyle/>
+                    <a:p>
+                      <a:pPr algn="ctr"/>
+                      <a:r>
+                        <a:rPr lang="en-US" sz="1500" dirty="0"/>
+                        <a:t>*</a:t>
+                      </a:r>
+                    </a:p>
+                  </a:txBody>
+                  <a:tcPr/>
+                </a:tc>
+                <a:extLst>
+                  <a:ext uri="{0D108BD9-81ED-4DB2-BD59-A6C34878D82A}">
+                    <a16:rowId xmlns:a16="http://schemas.microsoft.com/office/drawing/2014/main" val="10004"/>
+                  </a:ext>
+                </a:extLst>
+              </a:tr>
+            </a:tbl>
+          </a:graphicData>
+        </a:graphic>
+      </p:graphicFrame>
+    </p:spTree>
+    <p:extLst>
+      <p:ext uri="{BB962C8B-B14F-4D97-AF65-F5344CB8AC3E}">
+        <p14:creationId xmlns:p14="http://schemas.microsoft.com/office/powerpoint/2010/main" val="562425202"/>
       </p:ext>
     </p:extLst>
   </p:cSld>

</xml_diff>